<commit_message>
Novos slides de tratamento de exceções.
</commit_message>
<xml_diff>
--- a/2-Java-Programmer-Modulo-II/12.Capitulo06.pptx
+++ b/2-Java-Programmer-Modulo-II/12.Capitulo06.pptx
@@ -5,21 +5,22 @@
     <p:sldMasterId id="2147483660" r:id="rId1"/>
   </p:sldMasterIdLst>
   <p:notesMasterIdLst>
-    <p:notesMasterId r:id="rId14"/>
+    <p:notesMasterId r:id="rId15"/>
   </p:notesMasterIdLst>
   <p:sldIdLst>
     <p:sldId id="256" r:id="rId2"/>
     <p:sldId id="318" r:id="rId3"/>
     <p:sldId id="319" r:id="rId4"/>
     <p:sldId id="320" r:id="rId5"/>
-    <p:sldId id="321" r:id="rId6"/>
-    <p:sldId id="322" r:id="rId7"/>
-    <p:sldId id="323" r:id="rId8"/>
-    <p:sldId id="324" r:id="rId9"/>
-    <p:sldId id="325" r:id="rId10"/>
-    <p:sldId id="326" r:id="rId11"/>
-    <p:sldId id="327" r:id="rId12"/>
-    <p:sldId id="328" r:id="rId13"/>
+    <p:sldId id="329" r:id="rId6"/>
+    <p:sldId id="330" r:id="rId7"/>
+    <p:sldId id="322" r:id="rId8"/>
+    <p:sldId id="323" r:id="rId9"/>
+    <p:sldId id="324" r:id="rId10"/>
+    <p:sldId id="325" r:id="rId11"/>
+    <p:sldId id="326" r:id="rId12"/>
+    <p:sldId id="327" r:id="rId13"/>
+    <p:sldId id="328" r:id="rId14"/>
   </p:sldIdLst>
   <p:sldSz cx="9144000" cy="6858000" type="screen4x3"/>
   <p:notesSz cx="6858000" cy="9144000"/>
@@ -260,7 +261,7 @@
               <a:pPr>
                 <a:defRPr/>
               </a:pPr>
-              <a:t>04/04/2012</a:t>
+              <a:t>05/04/2012</a:t>
             </a:fld>
             <a:endParaRPr lang="pt-BR"/>
           </a:p>
@@ -971,6 +972,93 @@
 </p:notes>
 </file>
 
+<file path=ppt/notesSlides/notesSlide13.xml><?xml version="1.0" encoding="utf-8"?>
+<p:notes xmlns:a="http://schemas.openxmlformats.org/drawingml/2006/main" xmlns:r="http://schemas.openxmlformats.org/officeDocument/2006/relationships" xmlns:p="http://schemas.openxmlformats.org/presentationml/2006/main">
+  <p:cSld>
+    <p:spTree>
+      <p:nvGrpSpPr>
+        <p:cNvPr id="1" name=""/>
+        <p:cNvGrpSpPr/>
+        <p:nvPr/>
+      </p:nvGrpSpPr>
+      <p:grpSpPr>
+        <a:xfrm>
+          <a:off x="0" y="0"/>
+          <a:ext cx="0" cy="0"/>
+          <a:chOff x="0" y="0"/>
+          <a:chExt cx="0" cy="0"/>
+        </a:xfrm>
+      </p:grpSpPr>
+      <p:sp>
+        <p:nvSpPr>
+          <p:cNvPr id="2" name="Espaço Reservado para Imagem de Slide 1"/>
+          <p:cNvSpPr>
+            <a:spLocks noGrp="1" noRot="1" noChangeAspect="1"/>
+          </p:cNvSpPr>
+          <p:nvPr>
+            <p:ph type="sldImg"/>
+          </p:nvPr>
+        </p:nvSpPr>
+        <p:spPr/>
+      </p:sp>
+      <p:sp>
+        <p:nvSpPr>
+          <p:cNvPr id="3" name="Espaço Reservado para Anotações 2"/>
+          <p:cNvSpPr>
+            <a:spLocks noGrp="1"/>
+          </p:cNvSpPr>
+          <p:nvPr>
+            <p:ph type="body" idx="1"/>
+          </p:nvPr>
+        </p:nvSpPr>
+        <p:spPr/>
+        <p:txBody>
+          <a:bodyPr>
+            <a:normAutofit/>
+          </a:bodyPr>
+          <a:lstStyle/>
+          <a:p>
+            <a:endParaRPr lang="pt-BR"/>
+          </a:p>
+        </p:txBody>
+      </p:sp>
+      <p:sp>
+        <p:nvSpPr>
+          <p:cNvPr id="4" name="Espaço Reservado para Número de Slide 3"/>
+          <p:cNvSpPr>
+            <a:spLocks noGrp="1"/>
+          </p:cNvSpPr>
+          <p:nvPr>
+            <p:ph type="sldNum" sz="quarter" idx="10"/>
+          </p:nvPr>
+        </p:nvSpPr>
+        <p:spPr/>
+        <p:txBody>
+          <a:bodyPr/>
+          <a:lstStyle/>
+          <a:p>
+            <a:pPr>
+              <a:defRPr/>
+            </a:pPr>
+            <a:fld id="{A1564085-A201-4A92-B865-4522CAEE4E86}" type="slidenum">
+              <a:rPr lang="pt-BR" smtClean="0"/>
+              <a:pPr>
+                <a:defRPr/>
+              </a:pPr>
+              <a:t>13</a:t>
+            </a:fld>
+            <a:endParaRPr lang="pt-BR"/>
+          </a:p>
+        </p:txBody>
+      </p:sp>
+    </p:spTree>
+  </p:cSld>
+  <p:clrMapOvr>
+    <a:masterClrMapping/>
+  </p:clrMapOvr>
+</p:notes>
+</file>
+
 <file path=ppt/notesSlides/notesSlide2.xml><?xml version="1.0" encoding="utf-8"?>
 <p:notes xmlns:a="http://schemas.openxmlformats.org/drawingml/2006/main" xmlns:r="http://schemas.openxmlformats.org/officeDocument/2006/relationships" xmlns:p="http://schemas.openxmlformats.org/presentationml/2006/main">
   <p:cSld>
@@ -1384,14 +1472,9 @@
           <a:bodyPr/>
           <a:lstStyle/>
           <a:p>
-            <a:pPr>
-              <a:defRPr/>
-            </a:pPr>
-            <a:fld id="{A1564085-A201-4A92-B865-4522CAEE4E86}" type="slidenum">
+            <a:fld id="{47CE234B-CAFC-4F2B-98A6-DCA9BBF6B41C}" type="slidenum">
               <a:rPr lang="pt-BR" smtClean="0"/>
-              <a:pPr>
-                <a:defRPr/>
-              </a:pPr>
+              <a:pPr/>
               <a:t>6</a:t>
             </a:fld>
             <a:endParaRPr lang="pt-BR"/>
@@ -2082,7 +2165,10 @@
             </a:pPr>
             <a:fld id="{EEA26EEE-DF2A-48EA-A73A-AB2D54A1DB2A}" type="datetime1">
               <a:rPr lang="pt-BR" smtClean="0"/>
-              <a:t>04/04/2012</a:t>
+              <a:pPr>
+                <a:defRPr/>
+              </a:pPr>
+              <a:t>05/04/2012</a:t>
             </a:fld>
             <a:endParaRPr lang="pt-BR"/>
           </a:p>
@@ -2271,7 +2357,10 @@
             </a:pPr>
             <a:fld id="{413AD136-109B-416C-AB31-135BF8710F08}" type="datetime1">
               <a:rPr lang="pt-BR" smtClean="0"/>
-              <a:t>04/04/2012</a:t>
+              <a:pPr>
+                <a:defRPr/>
+              </a:pPr>
+              <a:t>05/04/2012</a:t>
             </a:fld>
             <a:endParaRPr lang="pt-BR"/>
           </a:p>
@@ -2470,7 +2559,10 @@
             </a:pPr>
             <a:fld id="{EF6378E6-001B-4A8D-BA6B-320E1CDD92DF}" type="datetime1">
               <a:rPr lang="pt-BR" smtClean="0"/>
-              <a:t>04/04/2012</a:t>
+              <a:pPr>
+                <a:defRPr/>
+              </a:pPr>
+              <a:t>05/04/2012</a:t>
             </a:fld>
             <a:endParaRPr lang="pt-BR"/>
           </a:p>
@@ -2663,7 +2755,10 @@
             </a:pPr>
             <a:fld id="{4923B301-4D33-472B-9EA1-FE4739FFB887}" type="datetime1">
               <a:rPr lang="pt-BR" smtClean="0"/>
-              <a:t>04/04/2012</a:t>
+              <a:pPr>
+                <a:defRPr/>
+              </a:pPr>
+              <a:t>05/04/2012</a:t>
             </a:fld>
             <a:endParaRPr lang="pt-BR"/>
           </a:p>
@@ -3166,7 +3261,10 @@
             </a:pPr>
             <a:fld id="{C2782E46-77E0-4AB1-A75D-9CBA80F15487}" type="datetime1">
               <a:rPr lang="pt-BR" smtClean="0"/>
-              <a:t>04/04/2012</a:t>
+              <a:pPr>
+                <a:defRPr/>
+              </a:pPr>
+              <a:t>05/04/2012</a:t>
             </a:fld>
             <a:endParaRPr lang="pt-BR"/>
           </a:p>
@@ -3454,7 +3552,10 @@
             </a:pPr>
             <a:fld id="{359D2ED1-D587-44B6-A55F-C7E9981403E2}" type="datetime1">
               <a:rPr lang="pt-BR" smtClean="0"/>
-              <a:t>04/04/2012</a:t>
+              <a:pPr>
+                <a:defRPr/>
+              </a:pPr>
+              <a:t>05/04/2012</a:t>
             </a:fld>
             <a:endParaRPr lang="pt-BR"/>
           </a:p>
@@ -3852,7 +3953,10 @@
             </a:pPr>
             <a:fld id="{A2418DAE-4C14-46BA-B6A9-566ED2C85393}" type="datetime1">
               <a:rPr lang="pt-BR" smtClean="0"/>
-              <a:t>04/04/2012</a:t>
+              <a:pPr>
+                <a:defRPr/>
+              </a:pPr>
+              <a:t>05/04/2012</a:t>
             </a:fld>
             <a:endParaRPr lang="pt-BR"/>
           </a:p>
@@ -3998,7 +4102,10 @@
             </a:pPr>
             <a:fld id="{BFA1B665-AFC7-49F0-8309-B0D524735A69}" type="datetime1">
               <a:rPr lang="pt-BR" smtClean="0"/>
-              <a:t>04/04/2012</a:t>
+              <a:pPr>
+                <a:defRPr/>
+              </a:pPr>
+              <a:t>05/04/2012</a:t>
             </a:fld>
             <a:endParaRPr lang="pt-BR"/>
           </a:p>
@@ -4112,7 +4219,10 @@
             </a:pPr>
             <a:fld id="{224F40D6-50D9-41CF-A7D0-FF437F5524B1}" type="datetime1">
               <a:rPr lang="pt-BR" smtClean="0"/>
-              <a:t>04/04/2012</a:t>
+              <a:pPr>
+                <a:defRPr/>
+              </a:pPr>
+              <a:t>05/04/2012</a:t>
             </a:fld>
             <a:endParaRPr lang="pt-BR"/>
           </a:p>
@@ -4385,7 +4495,10 @@
             </a:pPr>
             <a:fld id="{4BD6C902-3F3E-4D4C-ABB1-256ED3FA33D5}" type="datetime1">
               <a:rPr lang="pt-BR" smtClean="0"/>
-              <a:t>04/04/2012</a:t>
+              <a:pPr>
+                <a:defRPr/>
+              </a:pPr>
+              <a:t>05/04/2012</a:t>
             </a:fld>
             <a:endParaRPr lang="pt-BR"/>
           </a:p>
@@ -4666,7 +4779,10 @@
             </a:pPr>
             <a:fld id="{57C2A98F-05F6-48F8-A21F-3ECAEA3B5D43}" type="datetime1">
               <a:rPr lang="pt-BR" smtClean="0"/>
-              <a:t>04/04/2012</a:t>
+              <a:pPr>
+                <a:defRPr/>
+              </a:pPr>
+              <a:t>05/04/2012</a:t>
             </a:fld>
             <a:endParaRPr lang="pt-BR"/>
           </a:p>
@@ -5141,7 +5257,10 @@
             </a:pPr>
             <a:fld id="{F2EC0DF7-6950-4DFB-9681-08CDE4FE5FFA}" type="datetime1">
               <a:rPr lang="pt-BR" smtClean="0"/>
-              <a:t>04/04/2012</a:t>
+              <a:pPr>
+                <a:defRPr/>
+              </a:pPr>
+              <a:t>05/04/2012</a:t>
             </a:fld>
             <a:endParaRPr lang="pt-BR"/>
           </a:p>
@@ -5823,7 +5942,7 @@
                 <a:ea typeface="+mj-ea"/>
                 <a:cs typeface="+mj-cs"/>
               </a:rPr>
-              <a:t>finally</a:t>
+              <a:t>throws</a:t>
             </a:r>
             <a:endParaRPr lang="pt-BR" dirty="0"/>
           </a:p>
@@ -5938,7 +6057,7 @@
                 <a:ea typeface="+mj-ea"/>
                 <a:cs typeface="+mj-cs"/>
               </a:rPr>
-              <a:t>throw</a:t>
+              <a:t>finally</a:t>
             </a:r>
             <a:endParaRPr lang="pt-BR" dirty="0"/>
           </a:p>
@@ -6042,8 +6161,20 @@
                 <a:ea typeface="+mj-ea"/>
                 <a:cs typeface="+mj-cs"/>
               </a:rPr>
-              <a:t>Exceções personalizadas</a:t>
-            </a:r>
+              <a:t>Cláusula </a:t>
+            </a:r>
+            <a:r>
+              <a:rPr lang="pt-BR" sz="4600" kern="1200" dirty="0" err="1" smtClean="0">
+                <a:solidFill>
+                  <a:schemeClr val="tx1"/>
+                </a:solidFill>
+                <a:latin typeface="+mj-lt"/>
+                <a:ea typeface="+mj-ea"/>
+                <a:cs typeface="+mj-cs"/>
+              </a:rPr>
+              <a:t>throw</a:t>
+            </a:r>
+            <a:endParaRPr lang="pt-BR" dirty="0"/>
           </a:p>
         </p:txBody>
       </p:sp>
@@ -6090,6 +6221,109 @@
                 <a:defRPr/>
               </a:pPr>
               <a:t>12</a:t>
+            </a:fld>
+            <a:endParaRPr lang="pt-BR"/>
+          </a:p>
+        </p:txBody>
+      </p:sp>
+    </p:spTree>
+  </p:cSld>
+  <p:clrMapOvr>
+    <a:masterClrMapping/>
+  </p:clrMapOvr>
+</p:sld>
+</file>
+
+<file path=ppt/slides/slide13.xml><?xml version="1.0" encoding="utf-8"?>
+<p:sld xmlns:a="http://schemas.openxmlformats.org/drawingml/2006/main" xmlns:r="http://schemas.openxmlformats.org/officeDocument/2006/relationships" xmlns:p="http://schemas.openxmlformats.org/presentationml/2006/main">
+  <p:cSld>
+    <p:spTree>
+      <p:nvGrpSpPr>
+        <p:cNvPr id="1" name=""/>
+        <p:cNvGrpSpPr/>
+        <p:nvPr/>
+      </p:nvGrpSpPr>
+      <p:grpSpPr>
+        <a:xfrm>
+          <a:off x="0" y="0"/>
+          <a:ext cx="0" cy="0"/>
+          <a:chOff x="0" y="0"/>
+          <a:chExt cx="0" cy="0"/>
+        </a:xfrm>
+      </p:grpSpPr>
+      <p:sp>
+        <p:nvSpPr>
+          <p:cNvPr id="2" name="Título 1"/>
+          <p:cNvSpPr>
+            <a:spLocks noGrp="1"/>
+          </p:cNvSpPr>
+          <p:nvPr>
+            <p:ph type="title"/>
+          </p:nvPr>
+        </p:nvSpPr>
+        <p:spPr/>
+        <p:txBody>
+          <a:bodyPr/>
+          <a:lstStyle/>
+          <a:p>
+            <a:pPr rtl="0" eaLnBrk="1" fontAlgn="base" hangingPunct="1"/>
+            <a:r>
+              <a:rPr lang="pt-BR" sz="4600" kern="1200" dirty="0" smtClean="0">
+                <a:solidFill>
+                  <a:schemeClr val="tx1"/>
+                </a:solidFill>
+                <a:latin typeface="+mj-lt"/>
+                <a:ea typeface="+mj-ea"/>
+                <a:cs typeface="+mj-cs"/>
+              </a:rPr>
+              <a:t>Exceções personalizadas</a:t>
+            </a:r>
+          </a:p>
+        </p:txBody>
+      </p:sp>
+      <p:sp>
+        <p:nvSpPr>
+          <p:cNvPr id="6" name="Espaço Reservado para Conteúdo 5"/>
+          <p:cNvSpPr>
+            <a:spLocks noGrp="1"/>
+          </p:cNvSpPr>
+          <p:nvPr>
+            <p:ph idx="1"/>
+          </p:nvPr>
+        </p:nvSpPr>
+        <p:spPr/>
+        <p:txBody>
+          <a:bodyPr/>
+          <a:lstStyle/>
+          <a:p>
+            <a:endParaRPr lang="pt-BR"/>
+          </a:p>
+        </p:txBody>
+      </p:sp>
+      <p:sp>
+        <p:nvSpPr>
+          <p:cNvPr id="5" name="Espaço Reservado para Número de Slide 4"/>
+          <p:cNvSpPr>
+            <a:spLocks noGrp="1"/>
+          </p:cNvSpPr>
+          <p:nvPr>
+            <p:ph type="sldNum" sz="quarter" idx="12"/>
+          </p:nvPr>
+        </p:nvSpPr>
+        <p:spPr/>
+        <p:txBody>
+          <a:bodyPr/>
+          <a:lstStyle/>
+          <a:p>
+            <a:pPr>
+              <a:defRPr/>
+            </a:pPr>
+            <a:fld id="{DAB16DC1-F000-4B90-9425-1E014EE80EC3}" type="slidenum">
+              <a:rPr lang="pt-BR" smtClean="0"/>
+              <a:pPr>
+                <a:defRPr/>
+              </a:pPr>
+              <a:t>13</a:t>
             </a:fld>
             <a:endParaRPr lang="pt-BR"/>
           </a:p>
@@ -6163,7 +6397,6 @@
               <a:rPr lang="pt-BR" sz="2800" dirty="0" smtClean="0"/>
               <a:t>Exceptions</a:t>
             </a:r>
-            <a:endParaRPr lang="pt-BR" sz="2800" dirty="0" smtClean="0"/>
           </a:p>
           <a:p>
             <a:pPr eaLnBrk="1" hangingPunct="1"/>
@@ -6184,11 +6417,7 @@
             <a:pPr eaLnBrk="1" hangingPunct="1"/>
             <a:r>
               <a:rPr lang="pt-BR" sz="2800" dirty="0" smtClean="0"/>
-              <a:t>Hierarquia de </a:t>
-            </a:r>
-            <a:r>
-              <a:rPr lang="pt-BR" sz="2800" dirty="0" smtClean="0"/>
-              <a:t>Exceptions</a:t>
+              <a:t>Hierarquia de Exceptions</a:t>
             </a:r>
           </a:p>
           <a:p>
@@ -6204,7 +6433,6 @@
               <a:rPr lang="pt-BR" sz="2800" dirty="0" smtClean="0"/>
               <a:t>Principais métodos de exceções</a:t>
             </a:r>
-            <a:endParaRPr lang="pt-BR" sz="2800" dirty="0" smtClean="0"/>
           </a:p>
         </p:txBody>
       </p:sp>
@@ -6292,7 +6520,6 @@
               <a:rPr lang="pt-BR" sz="2800" dirty="0" smtClean="0"/>
               <a:t>Exceções personalizadas</a:t>
             </a:r>
-            <a:endParaRPr lang="pt-BR" sz="2800" dirty="0" smtClean="0"/>
           </a:p>
         </p:txBody>
       </p:sp>
@@ -6540,56 +6767,118 @@
             <p:ph idx="1"/>
           </p:nvPr>
         </p:nvSpPr>
-        <p:spPr/>
+        <p:spPr>
+          <a:xfrm>
+            <a:off x="713656" y="1600200"/>
+            <a:ext cx="6954688" cy="4525963"/>
+          </a:xfrm>
+        </p:spPr>
         <p:txBody>
           <a:bodyPr/>
           <a:lstStyle/>
           <a:p>
-            <a:r>
-              <a:rPr lang="pt-BR" dirty="0" err="1" smtClean="0"/>
+            <a:pPr marL="0" indent="0">
+              <a:buNone/>
+            </a:pPr>
+            <a:r>
+              <a:rPr lang="pt-BR" dirty="0" err="1" smtClean="0">
+                <a:solidFill>
+                  <a:srgbClr val="FFC000"/>
+                </a:solidFill>
+              </a:rPr>
               <a:t>try</a:t>
             </a:r>
             <a:r>
-              <a:rPr lang="pt-BR" dirty="0" smtClean="0"/>
+              <a:rPr lang="pt-BR" dirty="0" smtClean="0">
+                <a:solidFill>
+                  <a:srgbClr val="FFC000"/>
+                </a:solidFill>
+              </a:rPr>
               <a:t> {</a:t>
             </a:r>
           </a:p>
           <a:p>
-            <a:r>
-              <a:rPr lang="pt-BR" dirty="0" smtClean="0"/>
+            <a:pPr marL="0" indent="0">
+              <a:buNone/>
+            </a:pPr>
+            <a:r>
+              <a:rPr lang="pt-BR" dirty="0" smtClean="0">
+                <a:solidFill>
+                  <a:schemeClr val="accent6"/>
+                </a:solidFill>
+              </a:rPr>
               <a:t>	// Instruções sujeitas</a:t>
             </a:r>
           </a:p>
           <a:p>
-            <a:r>
-              <a:rPr lang="pt-BR" dirty="0" smtClean="0"/>
+            <a:pPr marL="0" indent="0">
+              <a:buNone/>
+            </a:pPr>
+            <a:r>
+              <a:rPr lang="pt-BR" dirty="0" smtClean="0">
+                <a:solidFill>
+                  <a:schemeClr val="accent6"/>
+                </a:solidFill>
+              </a:rPr>
               <a:t>	// a falhas</a:t>
             </a:r>
           </a:p>
           <a:p>
-            <a:r>
-              <a:rPr lang="pt-BR" dirty="0" smtClean="0"/>
+            <a:pPr marL="0" indent="0">
+              <a:buNone/>
+            </a:pPr>
+            <a:r>
+              <a:rPr lang="pt-BR" dirty="0" smtClean="0">
+                <a:solidFill>
+                  <a:srgbClr val="FFC000"/>
+                </a:solidFill>
+              </a:rPr>
               <a:t>} catch (Exception e) {</a:t>
             </a:r>
           </a:p>
           <a:p>
-            <a:r>
-              <a:rPr lang="pt-BR" dirty="0" smtClean="0"/>
+            <a:pPr marL="0" indent="0">
+              <a:buNone/>
+            </a:pPr>
+            <a:r>
+              <a:rPr lang="pt-BR" dirty="0" smtClean="0">
+                <a:solidFill>
+                  <a:schemeClr val="accent6"/>
+                </a:solidFill>
+              </a:rPr>
               <a:t>	// Instruções a serem executadas</a:t>
             </a:r>
           </a:p>
           <a:p>
-            <a:r>
-              <a:rPr lang="pt-BR" dirty="0" smtClean="0"/>
+            <a:pPr marL="0" indent="0">
+              <a:buNone/>
+            </a:pPr>
+            <a:r>
+              <a:rPr lang="pt-BR" dirty="0" smtClean="0">
+                <a:solidFill>
+                  <a:schemeClr val="accent6"/>
+                </a:solidFill>
+              </a:rPr>
               <a:t>	// em caso de falha</a:t>
             </a:r>
           </a:p>
           <a:p>
-            <a:r>
-              <a:rPr lang="pt-BR" smtClean="0"/>
+            <a:pPr marL="0" indent="0">
+              <a:buNone/>
+            </a:pPr>
+            <a:r>
+              <a:rPr lang="pt-BR" dirty="0" smtClean="0">
+                <a:solidFill>
+                  <a:srgbClr val="FFC000"/>
+                </a:solidFill>
+              </a:rPr>
               <a:t>}</a:t>
             </a:r>
-            <a:endParaRPr lang="pt-BR"/>
+            <a:endParaRPr lang="pt-BR" dirty="0">
+              <a:solidFill>
+                <a:srgbClr val="FFC000"/>
+              </a:solidFill>
+            </a:endParaRPr>
           </a:p>
         </p:txBody>
       </p:sp>
@@ -6627,6 +6916,13 @@
   <p:clrMapOvr>
     <a:masterClrMapping/>
   </p:clrMapOvr>
+  <p:timing>
+    <p:tnLst>
+      <p:par>
+        <p:cTn id="1" dur="indefinite" restart="never" nodeType="tmRoot"/>
+      </p:par>
+    </p:tnLst>
+  </p:timing>
 </p:sld>
 </file>
 
@@ -6664,6 +6960,17 @@
           <a:p>
             <a:pPr rtl="0" eaLnBrk="1" fontAlgn="base" hangingPunct="1"/>
             <a:r>
+              <a:rPr lang="pt-BR" sz="4600" kern="1200" dirty="0" err="1" smtClean="0">
+                <a:solidFill>
+                  <a:schemeClr val="tx1"/>
+                </a:solidFill>
+                <a:latin typeface="+mj-lt"/>
+                <a:ea typeface="+mj-ea"/>
+                <a:cs typeface="+mj-cs"/>
+              </a:rPr>
+              <a:t>try</a:t>
+            </a:r>
+            <a:r>
               <a:rPr lang="pt-BR" sz="4600" kern="1200" dirty="0" smtClean="0">
                 <a:solidFill>
                   <a:schemeClr val="tx1"/>
@@ -6672,7 +6979,22 @@
                 <a:ea typeface="+mj-ea"/>
                 <a:cs typeface="+mj-cs"/>
               </a:rPr>
-              <a:t>Hierarquia de Exceptions</a:t>
+              <a:t> / </a:t>
+            </a:r>
+            <a:r>
+              <a:rPr lang="pt-BR" sz="4600" kern="1200" dirty="0" smtClean="0">
+                <a:solidFill>
+                  <a:schemeClr val="tx1"/>
+                </a:solidFill>
+                <a:latin typeface="+mj-lt"/>
+                <a:ea typeface="+mj-ea"/>
+                <a:cs typeface="+mj-cs"/>
+              </a:rPr>
+              <a:t>catch – Exemp</a:t>
+            </a:r>
+            <a:r>
+              <a:rPr lang="pt-BR" dirty="0" smtClean="0"/>
+              <a:t>lo</a:t>
             </a:r>
             <a:endParaRPr lang="pt-BR" dirty="0"/>
           </a:p>
@@ -6688,12 +7010,186 @@
             <p:ph idx="1"/>
           </p:nvPr>
         </p:nvSpPr>
-        <p:spPr/>
+        <p:spPr>
+          <a:xfrm>
+            <a:off x="713656" y="1600200"/>
+            <a:ext cx="7458744" cy="4525963"/>
+          </a:xfrm>
+        </p:spPr>
         <p:txBody>
           <a:bodyPr/>
           <a:lstStyle/>
           <a:p>
-            <a:endParaRPr lang="pt-BR"/>
+            <a:pPr marL="0" indent="0">
+              <a:buNone/>
+            </a:pPr>
+            <a:r>
+              <a:rPr lang="pt-BR" dirty="0" err="1" smtClean="0">
+                <a:solidFill>
+                  <a:srgbClr val="FFC000"/>
+                </a:solidFill>
+              </a:rPr>
+              <a:t>try</a:t>
+            </a:r>
+            <a:r>
+              <a:rPr lang="pt-BR" dirty="0" smtClean="0">
+                <a:solidFill>
+                  <a:srgbClr val="FFC000"/>
+                </a:solidFill>
+              </a:rPr>
+              <a:t> {</a:t>
+            </a:r>
+          </a:p>
+          <a:p>
+            <a:pPr marL="0" indent="0">
+              <a:buNone/>
+            </a:pPr>
+            <a:r>
+              <a:rPr lang="pt-BR" dirty="0" smtClean="0"/>
+              <a:t>	</a:t>
+            </a:r>
+            <a:r>
+              <a:rPr lang="pt-BR" dirty="0" err="1" smtClean="0"/>
+              <a:t>Conexao</a:t>
+            </a:r>
+            <a:r>
+              <a:rPr lang="pt-BR" dirty="0" smtClean="0"/>
+              <a:t> </a:t>
+            </a:r>
+            <a:r>
+              <a:rPr lang="pt-BR" dirty="0" err="1" smtClean="0"/>
+              <a:t>cn</a:t>
+            </a:r>
+            <a:r>
+              <a:rPr lang="pt-BR" dirty="0" smtClean="0"/>
+              <a:t> = </a:t>
+            </a:r>
+            <a:r>
+              <a:rPr lang="pt-BR" dirty="0" err="1" smtClean="0"/>
+              <a:t>abrirConexao</a:t>
+            </a:r>
+            <a:r>
+              <a:rPr lang="pt-BR" dirty="0" smtClean="0"/>
+              <a:t>();</a:t>
+            </a:r>
+            <a:endParaRPr lang="pt-BR" dirty="0" smtClean="0"/>
+          </a:p>
+          <a:p>
+            <a:pPr marL="0" indent="0">
+              <a:buNone/>
+            </a:pPr>
+            <a:r>
+              <a:rPr lang="pt-BR" dirty="0" smtClean="0"/>
+              <a:t>	</a:t>
+            </a:r>
+            <a:r>
+              <a:rPr lang="pt-BR" dirty="0" err="1" smtClean="0"/>
+              <a:t>cn</a:t>
+            </a:r>
+            <a:r>
+              <a:rPr lang="pt-BR" dirty="0" smtClean="0"/>
+              <a:t>.</a:t>
+            </a:r>
+            <a:r>
+              <a:rPr lang="pt-BR" dirty="0" err="1" smtClean="0"/>
+              <a:t>gravarRegistro</a:t>
+            </a:r>
+            <a:r>
+              <a:rPr lang="pt-BR" dirty="0" smtClean="0"/>
+              <a:t>(aluno1);</a:t>
+            </a:r>
+            <a:endParaRPr lang="pt-BR" dirty="0" smtClean="0"/>
+          </a:p>
+          <a:p>
+            <a:pPr marL="0" indent="0">
+              <a:buNone/>
+            </a:pPr>
+            <a:r>
+              <a:rPr lang="pt-BR" dirty="0" smtClean="0">
+                <a:solidFill>
+                  <a:srgbClr val="FFC000"/>
+                </a:solidFill>
+              </a:rPr>
+              <a:t>} catch (Exception e) {</a:t>
+            </a:r>
+          </a:p>
+          <a:p>
+            <a:pPr marL="0" indent="0">
+              <a:buNone/>
+            </a:pPr>
+            <a:r>
+              <a:rPr lang="pt-BR" dirty="0" smtClean="0"/>
+              <a:t>	</a:t>
+            </a:r>
+            <a:r>
+              <a:rPr lang="pt-BR" dirty="0" smtClean="0"/>
+              <a:t>System.</a:t>
+            </a:r>
+            <a:r>
+              <a:rPr lang="pt-BR" dirty="0" err="1" smtClean="0"/>
+              <a:t>out.println</a:t>
+            </a:r>
+            <a:r>
+              <a:rPr lang="pt-BR" dirty="0" smtClean="0"/>
+              <a:t>(“Erro ao gravar”);</a:t>
+            </a:r>
+            <a:endParaRPr lang="pt-BR" dirty="0" smtClean="0"/>
+          </a:p>
+          <a:p>
+            <a:pPr marL="0" indent="0">
+              <a:buNone/>
+            </a:pPr>
+            <a:r>
+              <a:rPr lang="pt-BR" dirty="0" smtClean="0"/>
+              <a:t>	</a:t>
+            </a:r>
+            <a:r>
+              <a:rPr lang="pt-BR" dirty="0" smtClean="0"/>
+              <a:t>System.</a:t>
+            </a:r>
+            <a:r>
+              <a:rPr lang="pt-BR" dirty="0" err="1" smtClean="0"/>
+              <a:t>out.println</a:t>
+            </a:r>
+            <a:r>
+              <a:rPr lang="pt-BR" dirty="0" smtClean="0"/>
+              <a:t>(</a:t>
+            </a:r>
+            <a:r>
+              <a:rPr lang="pt-BR" dirty="0" err="1" smtClean="0">
+                <a:solidFill>
+                  <a:srgbClr val="FFC000"/>
+                </a:solidFill>
+              </a:rPr>
+              <a:t>e</a:t>
+            </a:r>
+            <a:r>
+              <a:rPr lang="pt-BR" dirty="0" err="1" smtClean="0"/>
+              <a:t>.getMessage</a:t>
+            </a:r>
+            <a:r>
+              <a:rPr lang="pt-BR" dirty="0" smtClean="0"/>
+              <a:t>());</a:t>
+            </a:r>
+            <a:endParaRPr lang="pt-BR" dirty="0" smtClean="0"/>
+          </a:p>
+          <a:p>
+            <a:pPr marL="0" indent="0">
+              <a:buNone/>
+            </a:pPr>
+            <a:r>
+              <a:rPr lang="pt-BR" dirty="0" smtClean="0">
+                <a:solidFill>
+                  <a:srgbClr val="FFC000"/>
+                </a:solidFill>
+              </a:rPr>
+              <a:t>}</a:t>
+            </a:r>
+            <a:endParaRPr lang="pt-BR" dirty="0">
+              <a:solidFill>
+                <a:srgbClr val="FFC000"/>
+              </a:solidFill>
+            </a:endParaRPr>
           </a:p>
         </p:txBody>
       </p:sp>
@@ -6731,6 +7227,13 @@
   <p:clrMapOvr>
     <a:masterClrMapping/>
   </p:clrMapOvr>
+  <p:timing>
+    <p:tnLst>
+      <p:par>
+        <p:cTn id="1" dur="indefinite" restart="never" nodeType="tmRoot"/>
+      </p:par>
+    </p:tnLst>
+  </p:timing>
 </p:sld>
 </file>
 
@@ -6753,9 +7256,9 @@
       </p:grpSpPr>
       <p:sp>
         <p:nvSpPr>
-          <p:cNvPr id="2" name="Título 1"/>
-          <p:cNvSpPr>
-            <a:spLocks noGrp="1"/>
+          <p:cNvPr id="510978" name="Rectangle 2"/>
+          <p:cNvSpPr>
+            <a:spLocks noGrp="1" noChangeArrowheads="1"/>
           </p:cNvSpPr>
           <p:nvPr>
             <p:ph type="title"/>
@@ -6766,33 +7269,1160 @@
           <a:bodyPr/>
           <a:lstStyle/>
           <a:p>
-            <a:pPr rtl="0" eaLnBrk="1" fontAlgn="base" hangingPunct="1"/>
-            <a:r>
-              <a:rPr lang="pt-BR" sz="4600" kern="1200" dirty="0" smtClean="0">
-                <a:solidFill>
-                  <a:schemeClr val="tx1"/>
-                </a:solidFill>
-                <a:latin typeface="+mj-lt"/>
-                <a:ea typeface="+mj-ea"/>
-                <a:cs typeface="+mj-cs"/>
-              </a:rPr>
-              <a:t>Principais exceções</a:t>
+            <a:r>
+              <a:rPr lang="pt-BR" dirty="0" smtClean="0"/>
+              <a:t>Hierarquia de Exceptions</a:t>
             </a:r>
             <a:endParaRPr lang="pt-BR" dirty="0"/>
           </a:p>
         </p:txBody>
       </p:sp>
-      <p:sp>
-        <p:nvSpPr>
-          <p:cNvPr id="6" name="Espaço Reservado para Conteúdo 5"/>
-          <p:cNvSpPr>
-            <a:spLocks noGrp="1"/>
-          </p:cNvSpPr>
-          <p:nvPr>
-            <p:ph idx="1"/>
-          </p:nvPr>
-        </p:nvSpPr>
-        <p:spPr/>
+      <p:graphicFrame>
+        <p:nvGraphicFramePr>
+          <p:cNvPr id="511009" name="Group 33"/>
+          <p:cNvGraphicFramePr>
+            <a:graphicFrameLocks noGrp="1"/>
+          </p:cNvGraphicFramePr>
+          <p:nvPr/>
+        </p:nvGraphicFramePr>
+        <p:xfrm>
+          <a:off x="3581400" y="1828800"/>
+          <a:ext cx="1905000" cy="398463"/>
+        </p:xfrm>
+        <a:graphic>
+          <a:graphicData uri="http://schemas.openxmlformats.org/drawingml/2006/table">
+            <a:tbl>
+              <a:tblPr/>
+              <a:tblGrid>
+                <a:gridCol w="1905000"/>
+              </a:tblGrid>
+              <a:tr h="398463">
+                <a:tc>
+                  <a:txBody>
+                    <a:bodyPr/>
+                    <a:lstStyle/>
+                    <a:p>
+                      <a:pPr marL="0" marR="0" lvl="0" indent="0" algn="ctr" defTabSz="914400" rtl="0" eaLnBrk="1" fontAlgn="base" latinLnBrk="0" hangingPunct="1">
+                        <a:lnSpc>
+                          <a:spcPct val="100000"/>
+                        </a:lnSpc>
+                        <a:spcBef>
+                          <a:spcPct val="60000"/>
+                        </a:spcBef>
+                        <a:spcAft>
+                          <a:spcPct val="0"/>
+                        </a:spcAft>
+                        <a:buClr>
+                          <a:schemeClr val="tx1"/>
+                        </a:buClr>
+                        <a:buSzTx/>
+                        <a:buFontTx/>
+                        <a:buNone/>
+                        <a:tabLst/>
+                      </a:pPr>
+                      <a:r>
+                        <a:rPr kumimoji="0" lang="pt-BR" sz="1600" b="0" i="0" u="none" strike="noStrike" cap="none" normalizeH="0" baseline="0" smtClean="0">
+                          <a:ln>
+                            <a:noFill/>
+                          </a:ln>
+                          <a:solidFill>
+                            <a:schemeClr val="tx1"/>
+                          </a:solidFill>
+                          <a:effectLst/>
+                          <a:latin typeface="Arial" charset="0"/>
+                        </a:rPr>
+                        <a:t>Throwable</a:t>
+                      </a:r>
+                    </a:p>
+                  </a:txBody>
+                  <a:tcPr horzOverflow="overflow">
+                    <a:lnL w="28575" cap="flat" cmpd="sng" algn="ctr">
+                      <a:solidFill>
+                        <a:schemeClr val="tx1"/>
+                      </a:solidFill>
+                      <a:prstDash val="solid"/>
+                      <a:round/>
+                      <a:headEnd type="none" w="med" len="med"/>
+                      <a:tailEnd type="none" w="med" len="med"/>
+                    </a:lnL>
+                    <a:lnR w="28575" cap="flat" cmpd="sng" algn="ctr">
+                      <a:solidFill>
+                        <a:schemeClr val="tx1"/>
+                      </a:solidFill>
+                      <a:prstDash val="solid"/>
+                      <a:round/>
+                      <a:headEnd type="none" w="med" len="med"/>
+                      <a:tailEnd type="none" w="med" len="med"/>
+                    </a:lnR>
+                    <a:lnT w="28575" cap="flat" cmpd="sng" algn="ctr">
+                      <a:solidFill>
+                        <a:schemeClr val="tx1"/>
+                      </a:solidFill>
+                      <a:prstDash val="solid"/>
+                      <a:round/>
+                      <a:headEnd type="none" w="med" len="med"/>
+                      <a:tailEnd type="none" w="med" len="med"/>
+                    </a:lnT>
+                    <a:lnB w="28575" cap="flat" cmpd="sng" algn="ctr">
+                      <a:solidFill>
+                        <a:schemeClr val="tx1"/>
+                      </a:solidFill>
+                      <a:prstDash val="solid"/>
+                      <a:round/>
+                      <a:headEnd type="none" w="med" len="med"/>
+                      <a:tailEnd type="none" w="med" len="med"/>
+                    </a:lnB>
+                    <a:lnTlToBr>
+                      <a:noFill/>
+                    </a:lnTlToBr>
+                    <a:lnBlToTr>
+                      <a:noFill/>
+                    </a:lnBlToTr>
+                    <a:noFill/>
+                  </a:tcPr>
+                </a:tc>
+              </a:tr>
+            </a:tbl>
+          </a:graphicData>
+        </a:graphic>
+      </p:graphicFrame>
+      <p:graphicFrame>
+        <p:nvGraphicFramePr>
+          <p:cNvPr id="511050" name="Group 74"/>
+          <p:cNvGraphicFramePr>
+            <a:graphicFrameLocks noGrp="1"/>
+          </p:cNvGraphicFramePr>
+          <p:nvPr/>
+        </p:nvGraphicFramePr>
+        <p:xfrm>
+          <a:off x="5029200" y="2619375"/>
+          <a:ext cx="1905000" cy="335280"/>
+        </p:xfrm>
+        <a:graphic>
+          <a:graphicData uri="http://schemas.openxmlformats.org/drawingml/2006/table">
+            <a:tbl>
+              <a:tblPr/>
+              <a:tblGrid>
+                <a:gridCol w="1905000"/>
+              </a:tblGrid>
+              <a:tr h="190500">
+                <a:tc>
+                  <a:txBody>
+                    <a:bodyPr/>
+                    <a:lstStyle/>
+                    <a:p>
+                      <a:pPr marL="0" marR="0" lvl="0" indent="0" algn="ctr" defTabSz="914400" rtl="0" eaLnBrk="1" fontAlgn="base" latinLnBrk="0" hangingPunct="1">
+                        <a:lnSpc>
+                          <a:spcPct val="100000"/>
+                        </a:lnSpc>
+                        <a:spcBef>
+                          <a:spcPct val="60000"/>
+                        </a:spcBef>
+                        <a:spcAft>
+                          <a:spcPct val="0"/>
+                        </a:spcAft>
+                        <a:buClr>
+                          <a:schemeClr val="tx1"/>
+                        </a:buClr>
+                        <a:buSzTx/>
+                        <a:buFontTx/>
+                        <a:buNone/>
+                        <a:tabLst/>
+                      </a:pPr>
+                      <a:r>
+                        <a:rPr kumimoji="0" lang="pt-BR" sz="1600" b="0" i="0" u="none" strike="noStrike" cap="none" normalizeH="0" baseline="0" smtClean="0">
+                          <a:ln>
+                            <a:noFill/>
+                          </a:ln>
+                          <a:solidFill>
+                            <a:schemeClr val="tx1"/>
+                          </a:solidFill>
+                          <a:effectLst/>
+                          <a:latin typeface="Arial" charset="0"/>
+                        </a:rPr>
+                        <a:t>Error</a:t>
+                      </a:r>
+                    </a:p>
+                  </a:txBody>
+                  <a:tcPr horzOverflow="overflow">
+                    <a:lnL w="28575" cap="flat" cmpd="sng" algn="ctr">
+                      <a:solidFill>
+                        <a:schemeClr val="tx1"/>
+                      </a:solidFill>
+                      <a:prstDash val="solid"/>
+                      <a:round/>
+                      <a:headEnd type="none" w="med" len="med"/>
+                      <a:tailEnd type="none" w="med" len="med"/>
+                    </a:lnL>
+                    <a:lnR w="28575" cap="flat" cmpd="sng" algn="ctr">
+                      <a:solidFill>
+                        <a:schemeClr val="tx1"/>
+                      </a:solidFill>
+                      <a:prstDash val="solid"/>
+                      <a:round/>
+                      <a:headEnd type="none" w="med" len="med"/>
+                      <a:tailEnd type="none" w="med" len="med"/>
+                    </a:lnR>
+                    <a:lnT w="28575" cap="flat" cmpd="sng" algn="ctr">
+                      <a:solidFill>
+                        <a:schemeClr val="tx1"/>
+                      </a:solidFill>
+                      <a:prstDash val="solid"/>
+                      <a:round/>
+                      <a:headEnd type="none" w="med" len="med"/>
+                      <a:tailEnd type="none" w="med" len="med"/>
+                    </a:lnT>
+                    <a:lnB w="28575" cap="flat" cmpd="sng" algn="ctr">
+                      <a:solidFill>
+                        <a:schemeClr val="tx1"/>
+                      </a:solidFill>
+                      <a:prstDash val="solid"/>
+                      <a:round/>
+                      <a:headEnd type="none" w="med" len="med"/>
+                      <a:tailEnd type="none" w="med" len="med"/>
+                    </a:lnB>
+                    <a:lnTlToBr>
+                      <a:noFill/>
+                    </a:lnTlToBr>
+                    <a:lnBlToTr>
+                      <a:noFill/>
+                    </a:lnBlToTr>
+                    <a:noFill/>
+                  </a:tcPr>
+                </a:tc>
+              </a:tr>
+            </a:tbl>
+          </a:graphicData>
+        </a:graphic>
+      </p:graphicFrame>
+      <p:graphicFrame>
+        <p:nvGraphicFramePr>
+          <p:cNvPr id="511049" name="Group 73"/>
+          <p:cNvGraphicFramePr>
+            <a:graphicFrameLocks noGrp="1"/>
+          </p:cNvGraphicFramePr>
+          <p:nvPr/>
+        </p:nvGraphicFramePr>
+        <p:xfrm>
+          <a:off x="2133600" y="2619375"/>
+          <a:ext cx="1905000" cy="335280"/>
+        </p:xfrm>
+        <a:graphic>
+          <a:graphicData uri="http://schemas.openxmlformats.org/drawingml/2006/table">
+            <a:tbl>
+              <a:tblPr/>
+              <a:tblGrid>
+                <a:gridCol w="1905000"/>
+              </a:tblGrid>
+              <a:tr h="190500">
+                <a:tc>
+                  <a:txBody>
+                    <a:bodyPr/>
+                    <a:lstStyle/>
+                    <a:p>
+                      <a:pPr marL="0" marR="0" lvl="0" indent="0" algn="ctr" defTabSz="914400" rtl="0" eaLnBrk="1" fontAlgn="base" latinLnBrk="0" hangingPunct="1">
+                        <a:lnSpc>
+                          <a:spcPct val="100000"/>
+                        </a:lnSpc>
+                        <a:spcBef>
+                          <a:spcPct val="60000"/>
+                        </a:spcBef>
+                        <a:spcAft>
+                          <a:spcPct val="0"/>
+                        </a:spcAft>
+                        <a:buClr>
+                          <a:schemeClr val="tx1"/>
+                        </a:buClr>
+                        <a:buSzTx/>
+                        <a:buFontTx/>
+                        <a:buNone/>
+                        <a:tabLst/>
+                      </a:pPr>
+                      <a:r>
+                        <a:rPr kumimoji="0" lang="pt-BR" sz="1600" b="0" i="0" u="none" strike="noStrike" cap="none" normalizeH="0" baseline="0" smtClean="0">
+                          <a:ln>
+                            <a:noFill/>
+                          </a:ln>
+                          <a:solidFill>
+                            <a:schemeClr val="tx1"/>
+                          </a:solidFill>
+                          <a:effectLst/>
+                          <a:latin typeface="Arial" charset="0"/>
+                        </a:rPr>
+                        <a:t>Exception</a:t>
+                      </a:r>
+                    </a:p>
+                  </a:txBody>
+                  <a:tcPr horzOverflow="overflow">
+                    <a:lnL w="28575" cap="flat" cmpd="sng" algn="ctr">
+                      <a:solidFill>
+                        <a:schemeClr val="tx1"/>
+                      </a:solidFill>
+                      <a:prstDash val="solid"/>
+                      <a:round/>
+                      <a:headEnd type="none" w="med" len="med"/>
+                      <a:tailEnd type="none" w="med" len="med"/>
+                    </a:lnL>
+                    <a:lnR w="28575" cap="flat" cmpd="sng" algn="ctr">
+                      <a:solidFill>
+                        <a:schemeClr val="tx1"/>
+                      </a:solidFill>
+                      <a:prstDash val="solid"/>
+                      <a:round/>
+                      <a:headEnd type="none" w="med" len="med"/>
+                      <a:tailEnd type="none" w="med" len="med"/>
+                    </a:lnR>
+                    <a:lnT w="28575" cap="flat" cmpd="sng" algn="ctr">
+                      <a:solidFill>
+                        <a:schemeClr val="tx1"/>
+                      </a:solidFill>
+                      <a:prstDash val="solid"/>
+                      <a:round/>
+                      <a:headEnd type="none" w="med" len="med"/>
+                      <a:tailEnd type="none" w="med" len="med"/>
+                    </a:lnT>
+                    <a:lnB w="28575" cap="flat" cmpd="sng" algn="ctr">
+                      <a:solidFill>
+                        <a:schemeClr val="tx1"/>
+                      </a:solidFill>
+                      <a:prstDash val="solid"/>
+                      <a:round/>
+                      <a:headEnd type="none" w="med" len="med"/>
+                      <a:tailEnd type="none" w="med" len="med"/>
+                    </a:lnB>
+                    <a:lnTlToBr>
+                      <a:noFill/>
+                    </a:lnTlToBr>
+                    <a:lnBlToTr>
+                      <a:noFill/>
+                    </a:lnBlToTr>
+                    <a:noFill/>
+                  </a:tcPr>
+                </a:tc>
+              </a:tr>
+            </a:tbl>
+          </a:graphicData>
+        </a:graphic>
+      </p:graphicFrame>
+      <p:grpSp>
+        <p:nvGrpSpPr>
+          <p:cNvPr id="2" name="Group 30"/>
+          <p:cNvGrpSpPr>
+            <a:grpSpLocks/>
+          </p:cNvGrpSpPr>
+          <p:nvPr/>
+        </p:nvGrpSpPr>
+        <p:grpSpPr bwMode="auto">
+          <a:xfrm rot="3773350">
+            <a:off x="3614737" y="2032001"/>
+            <a:ext cx="138113" cy="830262"/>
+            <a:chOff x="1134" y="4194"/>
+            <a:chExt cx="1440" cy="5580"/>
+          </a:xfrm>
+        </p:grpSpPr>
+        <p:sp>
+          <p:nvSpPr>
+            <p:cNvPr id="511007" name="AutoShape 31"/>
+            <p:cNvSpPr>
+              <a:spLocks noChangeArrowheads="1"/>
+            </p:cNvSpPr>
+            <p:nvPr/>
+          </p:nvSpPr>
+          <p:spPr bwMode="auto">
+            <a:xfrm>
+              <a:off x="1134" y="4194"/>
+              <a:ext cx="1440" cy="1260"/>
+            </a:xfrm>
+            <a:prstGeom prst="triangle">
+              <a:avLst>
+                <a:gd name="adj" fmla="val 50000"/>
+              </a:avLst>
+            </a:prstGeom>
+            <a:solidFill>
+              <a:srgbClr val="FFFFFF"/>
+            </a:solidFill>
+            <a:ln w="12700">
+              <a:solidFill>
+                <a:schemeClr val="tx1"/>
+              </a:solidFill>
+              <a:miter lim="800000"/>
+              <a:headEnd/>
+              <a:tailEnd/>
+            </a:ln>
+          </p:spPr>
+          <p:txBody>
+            <a:bodyPr/>
+            <a:lstStyle/>
+            <a:p>
+              <a:endParaRPr lang="pt-BR"/>
+            </a:p>
+          </p:txBody>
+        </p:sp>
+        <p:sp>
+          <p:nvSpPr>
+            <p:cNvPr id="511008" name="Line 32"/>
+            <p:cNvSpPr>
+              <a:spLocks noChangeShapeType="1"/>
+            </p:cNvSpPr>
+            <p:nvPr/>
+          </p:nvSpPr>
+          <p:spPr bwMode="auto">
+            <a:xfrm>
+              <a:off x="1854" y="5454"/>
+              <a:ext cx="0" cy="4320"/>
+            </a:xfrm>
+            <a:prstGeom prst="line">
+              <a:avLst/>
+            </a:prstGeom>
+            <a:noFill/>
+            <a:ln w="12700">
+              <a:solidFill>
+                <a:schemeClr val="tx1"/>
+              </a:solidFill>
+              <a:round/>
+              <a:headEnd/>
+              <a:tailEnd/>
+            </a:ln>
+          </p:spPr>
+          <p:txBody>
+            <a:bodyPr/>
+            <a:lstStyle/>
+            <a:p>
+              <a:endParaRPr lang="pt-BR"/>
+            </a:p>
+          </p:txBody>
+        </p:sp>
+      </p:grpSp>
+      <p:graphicFrame>
+        <p:nvGraphicFramePr>
+          <p:cNvPr id="511048" name="Group 72"/>
+          <p:cNvGraphicFramePr>
+            <a:graphicFrameLocks noGrp="1"/>
+          </p:cNvGraphicFramePr>
+          <p:nvPr/>
+        </p:nvGraphicFramePr>
+        <p:xfrm>
+          <a:off x="620713" y="3446463"/>
+          <a:ext cx="2035175" cy="335280"/>
+        </p:xfrm>
+        <a:graphic>
+          <a:graphicData uri="http://schemas.openxmlformats.org/drawingml/2006/table">
+            <a:tbl>
+              <a:tblPr/>
+              <a:tblGrid>
+                <a:gridCol w="2035175"/>
+              </a:tblGrid>
+              <a:tr h="190500">
+                <a:tc>
+                  <a:txBody>
+                    <a:bodyPr/>
+                    <a:lstStyle/>
+                    <a:p>
+                      <a:pPr marL="0" marR="0" lvl="0" indent="0" algn="ctr" defTabSz="914400" rtl="0" eaLnBrk="1" fontAlgn="base" latinLnBrk="0" hangingPunct="1">
+                        <a:lnSpc>
+                          <a:spcPct val="100000"/>
+                        </a:lnSpc>
+                        <a:spcBef>
+                          <a:spcPct val="60000"/>
+                        </a:spcBef>
+                        <a:spcAft>
+                          <a:spcPct val="0"/>
+                        </a:spcAft>
+                        <a:buClr>
+                          <a:schemeClr val="tx1"/>
+                        </a:buClr>
+                        <a:buSzTx/>
+                        <a:buFontTx/>
+                        <a:buNone/>
+                        <a:tabLst/>
+                      </a:pPr>
+                      <a:r>
+                        <a:rPr kumimoji="0" lang="pt-BR" sz="1600" b="0" i="0" u="none" strike="noStrike" cap="none" normalizeH="0" baseline="0" smtClean="0">
+                          <a:ln>
+                            <a:noFill/>
+                          </a:ln>
+                          <a:solidFill>
+                            <a:schemeClr val="tx1"/>
+                          </a:solidFill>
+                          <a:effectLst/>
+                          <a:latin typeface="Arial" charset="0"/>
+                        </a:rPr>
+                        <a:t>SQLException</a:t>
+                      </a:r>
+                    </a:p>
+                  </a:txBody>
+                  <a:tcPr horzOverflow="overflow">
+                    <a:lnL w="28575" cap="flat" cmpd="sng" algn="ctr">
+                      <a:solidFill>
+                        <a:schemeClr val="tx1"/>
+                      </a:solidFill>
+                      <a:prstDash val="solid"/>
+                      <a:round/>
+                      <a:headEnd type="none" w="med" len="med"/>
+                      <a:tailEnd type="none" w="med" len="med"/>
+                    </a:lnL>
+                    <a:lnR w="28575" cap="flat" cmpd="sng" algn="ctr">
+                      <a:solidFill>
+                        <a:schemeClr val="tx1"/>
+                      </a:solidFill>
+                      <a:prstDash val="solid"/>
+                      <a:round/>
+                      <a:headEnd type="none" w="med" len="med"/>
+                      <a:tailEnd type="none" w="med" len="med"/>
+                    </a:lnR>
+                    <a:lnT w="28575" cap="flat" cmpd="sng" algn="ctr">
+                      <a:solidFill>
+                        <a:schemeClr val="tx1"/>
+                      </a:solidFill>
+                      <a:prstDash val="solid"/>
+                      <a:round/>
+                      <a:headEnd type="none" w="med" len="med"/>
+                      <a:tailEnd type="none" w="med" len="med"/>
+                    </a:lnT>
+                    <a:lnB w="28575" cap="flat" cmpd="sng" algn="ctr">
+                      <a:solidFill>
+                        <a:schemeClr val="tx1"/>
+                      </a:solidFill>
+                      <a:prstDash val="solid"/>
+                      <a:round/>
+                      <a:headEnd type="none" w="med" len="med"/>
+                      <a:tailEnd type="none" w="med" len="med"/>
+                    </a:lnB>
+                    <a:lnTlToBr>
+                      <a:noFill/>
+                    </a:lnTlToBr>
+                    <a:lnBlToTr>
+                      <a:noFill/>
+                    </a:lnBlToTr>
+                    <a:noFill/>
+                  </a:tcPr>
+                </a:tc>
+              </a:tr>
+            </a:tbl>
+          </a:graphicData>
+        </a:graphic>
+      </p:graphicFrame>
+      <p:graphicFrame>
+        <p:nvGraphicFramePr>
+          <p:cNvPr id="511047" name="Group 71"/>
+          <p:cNvGraphicFramePr>
+            <a:graphicFrameLocks noGrp="1"/>
+          </p:cNvGraphicFramePr>
+          <p:nvPr/>
+        </p:nvGraphicFramePr>
+        <p:xfrm>
+          <a:off x="620713" y="4284663"/>
+          <a:ext cx="2035175" cy="335280"/>
+        </p:xfrm>
+        <a:graphic>
+          <a:graphicData uri="http://schemas.openxmlformats.org/drawingml/2006/table">
+            <a:tbl>
+              <a:tblPr/>
+              <a:tblGrid>
+                <a:gridCol w="2035175"/>
+              </a:tblGrid>
+              <a:tr h="190500">
+                <a:tc>
+                  <a:txBody>
+                    <a:bodyPr/>
+                    <a:lstStyle/>
+                    <a:p>
+                      <a:pPr marL="0" marR="0" lvl="0" indent="0" algn="ctr" defTabSz="914400" rtl="0" eaLnBrk="1" fontAlgn="base" latinLnBrk="0" hangingPunct="1">
+                        <a:lnSpc>
+                          <a:spcPct val="100000"/>
+                        </a:lnSpc>
+                        <a:spcBef>
+                          <a:spcPct val="60000"/>
+                        </a:spcBef>
+                        <a:spcAft>
+                          <a:spcPct val="0"/>
+                        </a:spcAft>
+                        <a:buClr>
+                          <a:schemeClr val="tx1"/>
+                        </a:buClr>
+                        <a:buSzTx/>
+                        <a:buFontTx/>
+                        <a:buNone/>
+                        <a:tabLst/>
+                      </a:pPr>
+                      <a:r>
+                        <a:rPr kumimoji="0" lang="pt-BR" sz="1600" b="0" i="0" u="none" strike="noStrike" cap="none" normalizeH="0" baseline="0" smtClean="0">
+                          <a:ln>
+                            <a:noFill/>
+                          </a:ln>
+                          <a:solidFill>
+                            <a:schemeClr val="tx1"/>
+                          </a:solidFill>
+                          <a:effectLst/>
+                          <a:latin typeface="Arial" charset="0"/>
+                        </a:rPr>
+                        <a:t>IOException</a:t>
+                      </a:r>
+                    </a:p>
+                  </a:txBody>
+                  <a:tcPr horzOverflow="overflow">
+                    <a:lnL w="28575" cap="flat" cmpd="sng" algn="ctr">
+                      <a:solidFill>
+                        <a:schemeClr val="tx1"/>
+                      </a:solidFill>
+                      <a:prstDash val="solid"/>
+                      <a:round/>
+                      <a:headEnd type="none" w="med" len="med"/>
+                      <a:tailEnd type="none" w="med" len="med"/>
+                    </a:lnL>
+                    <a:lnR w="28575" cap="flat" cmpd="sng" algn="ctr">
+                      <a:solidFill>
+                        <a:schemeClr val="tx1"/>
+                      </a:solidFill>
+                      <a:prstDash val="solid"/>
+                      <a:round/>
+                      <a:headEnd type="none" w="med" len="med"/>
+                      <a:tailEnd type="none" w="med" len="med"/>
+                    </a:lnR>
+                    <a:lnT w="28575" cap="flat" cmpd="sng" algn="ctr">
+                      <a:solidFill>
+                        <a:schemeClr val="tx1"/>
+                      </a:solidFill>
+                      <a:prstDash val="solid"/>
+                      <a:round/>
+                      <a:headEnd type="none" w="med" len="med"/>
+                      <a:tailEnd type="none" w="med" len="med"/>
+                    </a:lnT>
+                    <a:lnB w="28575" cap="flat" cmpd="sng" algn="ctr">
+                      <a:solidFill>
+                        <a:schemeClr val="tx1"/>
+                      </a:solidFill>
+                      <a:prstDash val="solid"/>
+                      <a:round/>
+                      <a:headEnd type="none" w="med" len="med"/>
+                      <a:tailEnd type="none" w="med" len="med"/>
+                    </a:lnB>
+                    <a:lnTlToBr>
+                      <a:noFill/>
+                    </a:lnTlToBr>
+                    <a:lnBlToTr>
+                      <a:noFill/>
+                    </a:lnBlToTr>
+                    <a:noFill/>
+                  </a:tcPr>
+                </a:tc>
+              </a:tr>
+            </a:tbl>
+          </a:graphicData>
+        </a:graphic>
+      </p:graphicFrame>
+      <p:graphicFrame>
+        <p:nvGraphicFramePr>
+          <p:cNvPr id="511046" name="Group 70"/>
+          <p:cNvGraphicFramePr>
+            <a:graphicFrameLocks noGrp="1"/>
+          </p:cNvGraphicFramePr>
+          <p:nvPr/>
+        </p:nvGraphicFramePr>
+        <p:xfrm>
+          <a:off x="3581400" y="3446463"/>
+          <a:ext cx="2035175" cy="335280"/>
+        </p:xfrm>
+        <a:graphic>
+          <a:graphicData uri="http://schemas.openxmlformats.org/drawingml/2006/table">
+            <a:tbl>
+              <a:tblPr/>
+              <a:tblGrid>
+                <a:gridCol w="2035175"/>
+              </a:tblGrid>
+              <a:tr h="190500">
+                <a:tc>
+                  <a:txBody>
+                    <a:bodyPr/>
+                    <a:lstStyle/>
+                    <a:p>
+                      <a:pPr marL="0" marR="0" lvl="0" indent="0" algn="ctr" defTabSz="914400" rtl="0" eaLnBrk="1" fontAlgn="base" latinLnBrk="0" hangingPunct="1">
+                        <a:lnSpc>
+                          <a:spcPct val="100000"/>
+                        </a:lnSpc>
+                        <a:spcBef>
+                          <a:spcPct val="60000"/>
+                        </a:spcBef>
+                        <a:spcAft>
+                          <a:spcPct val="0"/>
+                        </a:spcAft>
+                        <a:buClr>
+                          <a:schemeClr val="tx1"/>
+                        </a:buClr>
+                        <a:buSzTx/>
+                        <a:buFontTx/>
+                        <a:buNone/>
+                        <a:tabLst/>
+                      </a:pPr>
+                      <a:r>
+                        <a:rPr kumimoji="0" lang="pt-BR" sz="1600" b="0" i="0" u="none" strike="noStrike" cap="none" normalizeH="0" baseline="0" smtClean="0">
+                          <a:ln>
+                            <a:noFill/>
+                          </a:ln>
+                          <a:solidFill>
+                            <a:schemeClr val="tx1"/>
+                          </a:solidFill>
+                          <a:effectLst/>
+                          <a:latin typeface="Arial" charset="0"/>
+                        </a:rPr>
+                        <a:t>ParseException</a:t>
+                      </a:r>
+                    </a:p>
+                  </a:txBody>
+                  <a:tcPr horzOverflow="overflow">
+                    <a:lnL w="28575" cap="flat" cmpd="sng" algn="ctr">
+                      <a:solidFill>
+                        <a:schemeClr val="tx1"/>
+                      </a:solidFill>
+                      <a:prstDash val="solid"/>
+                      <a:round/>
+                      <a:headEnd type="none" w="med" len="med"/>
+                      <a:tailEnd type="none" w="med" len="med"/>
+                    </a:lnL>
+                    <a:lnR w="28575" cap="flat" cmpd="sng" algn="ctr">
+                      <a:solidFill>
+                        <a:schemeClr val="tx1"/>
+                      </a:solidFill>
+                      <a:prstDash val="solid"/>
+                      <a:round/>
+                      <a:headEnd type="none" w="med" len="med"/>
+                      <a:tailEnd type="none" w="med" len="med"/>
+                    </a:lnR>
+                    <a:lnT w="28575" cap="flat" cmpd="sng" algn="ctr">
+                      <a:solidFill>
+                        <a:schemeClr val="tx1"/>
+                      </a:solidFill>
+                      <a:prstDash val="solid"/>
+                      <a:round/>
+                      <a:headEnd type="none" w="med" len="med"/>
+                      <a:tailEnd type="none" w="med" len="med"/>
+                    </a:lnT>
+                    <a:lnB w="28575" cap="flat" cmpd="sng" algn="ctr">
+                      <a:solidFill>
+                        <a:schemeClr val="tx1"/>
+                      </a:solidFill>
+                      <a:prstDash val="solid"/>
+                      <a:round/>
+                      <a:headEnd type="none" w="med" len="med"/>
+                      <a:tailEnd type="none" w="med" len="med"/>
+                    </a:lnB>
+                    <a:lnTlToBr>
+                      <a:noFill/>
+                    </a:lnTlToBr>
+                    <a:lnBlToTr>
+                      <a:noFill/>
+                    </a:lnBlToTr>
+                    <a:noFill/>
+                  </a:tcPr>
+                </a:tc>
+              </a:tr>
+            </a:tbl>
+          </a:graphicData>
+        </a:graphic>
+      </p:graphicFrame>
+      <p:graphicFrame>
+        <p:nvGraphicFramePr>
+          <p:cNvPr id="511045" name="Group 69"/>
+          <p:cNvGraphicFramePr>
+            <a:graphicFrameLocks noGrp="1"/>
+          </p:cNvGraphicFramePr>
+          <p:nvPr/>
+        </p:nvGraphicFramePr>
+        <p:xfrm>
+          <a:off x="3581400" y="4284663"/>
+          <a:ext cx="2035175" cy="335280"/>
+        </p:xfrm>
+        <a:graphic>
+          <a:graphicData uri="http://schemas.openxmlformats.org/drawingml/2006/table">
+            <a:tbl>
+              <a:tblPr/>
+              <a:tblGrid>
+                <a:gridCol w="2035175"/>
+              </a:tblGrid>
+              <a:tr h="190500">
+                <a:tc>
+                  <a:txBody>
+                    <a:bodyPr/>
+                    <a:lstStyle/>
+                    <a:p>
+                      <a:pPr marL="0" marR="0" lvl="0" indent="0" algn="ctr" defTabSz="914400" rtl="0" eaLnBrk="1" fontAlgn="base" latinLnBrk="0" hangingPunct="1">
+                        <a:lnSpc>
+                          <a:spcPct val="100000"/>
+                        </a:lnSpc>
+                        <a:spcBef>
+                          <a:spcPct val="60000"/>
+                        </a:spcBef>
+                        <a:spcAft>
+                          <a:spcPct val="0"/>
+                        </a:spcAft>
+                        <a:buClr>
+                          <a:schemeClr val="tx1"/>
+                        </a:buClr>
+                        <a:buSzTx/>
+                        <a:buFontTx/>
+                        <a:buNone/>
+                        <a:tabLst/>
+                      </a:pPr>
+                      <a:r>
+                        <a:rPr kumimoji="0" lang="pt-BR" sz="1600" b="0" i="0" u="none" strike="noStrike" cap="none" normalizeH="0" baseline="0" smtClean="0">
+                          <a:ln>
+                            <a:noFill/>
+                          </a:ln>
+                          <a:solidFill>
+                            <a:schemeClr val="tx1"/>
+                          </a:solidFill>
+                          <a:effectLst/>
+                          <a:latin typeface="Arial" charset="0"/>
+                        </a:rPr>
+                        <a:t>RuntimeException</a:t>
+                      </a:r>
+                    </a:p>
+                  </a:txBody>
+                  <a:tcPr horzOverflow="overflow">
+                    <a:lnL w="28575" cap="flat" cmpd="sng" algn="ctr">
+                      <a:solidFill>
+                        <a:schemeClr val="tx1"/>
+                      </a:solidFill>
+                      <a:prstDash val="solid"/>
+                      <a:round/>
+                      <a:headEnd type="none" w="med" len="med"/>
+                      <a:tailEnd type="none" w="med" len="med"/>
+                    </a:lnL>
+                    <a:lnR w="28575" cap="flat" cmpd="sng" algn="ctr">
+                      <a:solidFill>
+                        <a:schemeClr val="tx1"/>
+                      </a:solidFill>
+                      <a:prstDash val="solid"/>
+                      <a:round/>
+                      <a:headEnd type="none" w="med" len="med"/>
+                      <a:tailEnd type="none" w="med" len="med"/>
+                    </a:lnR>
+                    <a:lnT w="28575" cap="flat" cmpd="sng" algn="ctr">
+                      <a:solidFill>
+                        <a:schemeClr val="tx1"/>
+                      </a:solidFill>
+                      <a:prstDash val="solid"/>
+                      <a:round/>
+                      <a:headEnd type="none" w="med" len="med"/>
+                      <a:tailEnd type="none" w="med" len="med"/>
+                    </a:lnT>
+                    <a:lnB w="28575" cap="flat" cmpd="sng" algn="ctr">
+                      <a:solidFill>
+                        <a:schemeClr val="tx1"/>
+                      </a:solidFill>
+                      <a:prstDash val="solid"/>
+                      <a:round/>
+                      <a:headEnd type="none" w="med" len="med"/>
+                      <a:tailEnd type="none" w="med" len="med"/>
+                    </a:lnB>
+                    <a:lnTlToBr>
+                      <a:noFill/>
+                    </a:lnTlToBr>
+                    <a:lnBlToTr>
+                      <a:noFill/>
+                    </a:lnBlToTr>
+                    <a:noFill/>
+                  </a:tcPr>
+                </a:tc>
+              </a:tr>
+            </a:tbl>
+          </a:graphicData>
+        </a:graphic>
+      </p:graphicFrame>
+      <p:grpSp>
+        <p:nvGrpSpPr>
+          <p:cNvPr id="3" name="Group 78"/>
+          <p:cNvGrpSpPr>
+            <a:grpSpLocks/>
+          </p:cNvGrpSpPr>
+          <p:nvPr/>
+        </p:nvGrpSpPr>
+        <p:grpSpPr bwMode="auto">
+          <a:xfrm rot="2987640">
+            <a:off x="2228057" y="2856706"/>
+            <a:ext cx="157162" cy="720725"/>
+            <a:chOff x="1134" y="4194"/>
+            <a:chExt cx="1440" cy="5580"/>
+          </a:xfrm>
+        </p:grpSpPr>
+        <p:sp>
+          <p:nvSpPr>
+            <p:cNvPr id="511055" name="AutoShape 79"/>
+            <p:cNvSpPr>
+              <a:spLocks noChangeArrowheads="1"/>
+            </p:cNvSpPr>
+            <p:nvPr/>
+          </p:nvSpPr>
+          <p:spPr bwMode="auto">
+            <a:xfrm>
+              <a:off x="1134" y="4194"/>
+              <a:ext cx="1440" cy="1260"/>
+            </a:xfrm>
+            <a:prstGeom prst="triangle">
+              <a:avLst>
+                <a:gd name="adj" fmla="val 50000"/>
+              </a:avLst>
+            </a:prstGeom>
+            <a:solidFill>
+              <a:srgbClr val="FFFFFF"/>
+            </a:solidFill>
+            <a:ln w="12700">
+              <a:solidFill>
+                <a:schemeClr val="tx1"/>
+              </a:solidFill>
+              <a:miter lim="800000"/>
+              <a:headEnd/>
+              <a:tailEnd/>
+            </a:ln>
+          </p:spPr>
+          <p:txBody>
+            <a:bodyPr/>
+            <a:lstStyle/>
+            <a:p>
+              <a:endParaRPr lang="pt-BR"/>
+            </a:p>
+          </p:txBody>
+        </p:sp>
+        <p:sp>
+          <p:nvSpPr>
+            <p:cNvPr id="511056" name="Line 80"/>
+            <p:cNvSpPr>
+              <a:spLocks noChangeShapeType="1"/>
+            </p:cNvSpPr>
+            <p:nvPr/>
+          </p:nvSpPr>
+          <p:spPr bwMode="auto">
+            <a:xfrm>
+              <a:off x="1854" y="5454"/>
+              <a:ext cx="0" cy="4320"/>
+            </a:xfrm>
+            <a:prstGeom prst="line">
+              <a:avLst/>
+            </a:prstGeom>
+            <a:noFill/>
+            <a:ln w="12700">
+              <a:solidFill>
+                <a:schemeClr val="tx1"/>
+              </a:solidFill>
+              <a:round/>
+              <a:headEnd/>
+              <a:tailEnd/>
+            </a:ln>
+          </p:spPr>
+          <p:txBody>
+            <a:bodyPr/>
+            <a:lstStyle/>
+            <a:p>
+              <a:endParaRPr lang="pt-BR"/>
+            </a:p>
+          </p:txBody>
+        </p:sp>
+      </p:grpSp>
+      <p:grpSp>
+        <p:nvGrpSpPr>
+          <p:cNvPr id="4" name="Group 81"/>
+          <p:cNvGrpSpPr>
+            <a:grpSpLocks/>
+          </p:cNvGrpSpPr>
+          <p:nvPr/>
+        </p:nvGrpSpPr>
+        <p:grpSpPr bwMode="auto">
+          <a:xfrm rot="18612360" flipH="1">
+            <a:off x="3863182" y="2856706"/>
+            <a:ext cx="157162" cy="720725"/>
+            <a:chOff x="1134" y="4194"/>
+            <a:chExt cx="1440" cy="5580"/>
+          </a:xfrm>
+        </p:grpSpPr>
+        <p:sp>
+          <p:nvSpPr>
+            <p:cNvPr id="511058" name="AutoShape 82"/>
+            <p:cNvSpPr>
+              <a:spLocks noChangeArrowheads="1"/>
+            </p:cNvSpPr>
+            <p:nvPr/>
+          </p:nvSpPr>
+          <p:spPr bwMode="auto">
+            <a:xfrm>
+              <a:off x="1134" y="4194"/>
+              <a:ext cx="1440" cy="1260"/>
+            </a:xfrm>
+            <a:prstGeom prst="triangle">
+              <a:avLst>
+                <a:gd name="adj" fmla="val 50000"/>
+              </a:avLst>
+            </a:prstGeom>
+            <a:solidFill>
+              <a:srgbClr val="FFFFFF"/>
+            </a:solidFill>
+            <a:ln w="12700">
+              <a:solidFill>
+                <a:schemeClr val="tx1"/>
+              </a:solidFill>
+              <a:miter lim="800000"/>
+              <a:headEnd/>
+              <a:tailEnd/>
+            </a:ln>
+          </p:spPr>
+          <p:txBody>
+            <a:bodyPr/>
+            <a:lstStyle/>
+            <a:p>
+              <a:endParaRPr lang="pt-BR"/>
+            </a:p>
+          </p:txBody>
+        </p:sp>
+        <p:sp>
+          <p:nvSpPr>
+            <p:cNvPr id="511059" name="Line 83"/>
+            <p:cNvSpPr>
+              <a:spLocks noChangeShapeType="1"/>
+            </p:cNvSpPr>
+            <p:nvPr/>
+          </p:nvSpPr>
+          <p:spPr bwMode="auto">
+            <a:xfrm>
+              <a:off x="1854" y="5454"/>
+              <a:ext cx="0" cy="4320"/>
+            </a:xfrm>
+            <a:prstGeom prst="line">
+              <a:avLst/>
+            </a:prstGeom>
+            <a:noFill/>
+            <a:ln w="12700">
+              <a:solidFill>
+                <a:schemeClr val="tx1"/>
+              </a:solidFill>
+              <a:round/>
+              <a:headEnd/>
+              <a:tailEnd/>
+            </a:ln>
+          </p:spPr>
+          <p:txBody>
+            <a:bodyPr/>
+            <a:lstStyle/>
+            <a:p>
+              <a:endParaRPr lang="pt-BR"/>
+            </a:p>
+          </p:txBody>
+        </p:sp>
+      </p:grpSp>
+      <p:grpSp>
+        <p:nvGrpSpPr>
+          <p:cNvPr id="5" name="Group 88"/>
+          <p:cNvGrpSpPr>
+            <a:grpSpLocks/>
+          </p:cNvGrpSpPr>
+          <p:nvPr/>
+        </p:nvGrpSpPr>
+        <p:grpSpPr bwMode="auto">
+          <a:xfrm>
+            <a:off x="2895600" y="2989263"/>
+            <a:ext cx="152400" cy="914400"/>
+            <a:chOff x="1134" y="4194"/>
+            <a:chExt cx="1440" cy="5580"/>
+          </a:xfrm>
+        </p:grpSpPr>
+        <p:sp>
+          <p:nvSpPr>
+            <p:cNvPr id="511065" name="AutoShape 89"/>
+            <p:cNvSpPr>
+              <a:spLocks noChangeArrowheads="1"/>
+            </p:cNvSpPr>
+            <p:nvPr/>
+          </p:nvSpPr>
+          <p:spPr bwMode="auto">
+            <a:xfrm>
+              <a:off x="1134" y="4194"/>
+              <a:ext cx="1440" cy="1260"/>
+            </a:xfrm>
+            <a:prstGeom prst="triangle">
+              <a:avLst>
+                <a:gd name="adj" fmla="val 50000"/>
+              </a:avLst>
+            </a:prstGeom>
+            <a:solidFill>
+              <a:srgbClr val="FFFFFF"/>
+            </a:solidFill>
+            <a:ln w="12700">
+              <a:solidFill>
+                <a:schemeClr val="tx1"/>
+              </a:solidFill>
+              <a:miter lim="800000"/>
+              <a:headEnd/>
+              <a:tailEnd/>
+            </a:ln>
+          </p:spPr>
+          <p:txBody>
+            <a:bodyPr/>
+            <a:lstStyle/>
+            <a:p>
+              <a:endParaRPr lang="pt-BR"/>
+            </a:p>
+          </p:txBody>
+        </p:sp>
+        <p:sp>
+          <p:nvSpPr>
+            <p:cNvPr id="511066" name="Line 90"/>
+            <p:cNvSpPr>
+              <a:spLocks noChangeShapeType="1"/>
+            </p:cNvSpPr>
+            <p:nvPr/>
+          </p:nvSpPr>
+          <p:spPr bwMode="auto">
+            <a:xfrm>
+              <a:off x="1854" y="5454"/>
+              <a:ext cx="0" cy="4320"/>
+            </a:xfrm>
+            <a:prstGeom prst="line">
+              <a:avLst/>
+            </a:prstGeom>
+            <a:noFill/>
+            <a:ln w="12700">
+              <a:solidFill>
+                <a:schemeClr val="tx1"/>
+              </a:solidFill>
+              <a:round/>
+              <a:headEnd/>
+              <a:tailEnd/>
+            </a:ln>
+          </p:spPr>
+          <p:txBody>
+            <a:bodyPr/>
+            <a:lstStyle/>
+            <a:p>
+              <a:endParaRPr lang="pt-BR"/>
+            </a:p>
+          </p:txBody>
+        </p:sp>
+      </p:grpSp>
+      <p:sp>
+        <p:nvSpPr>
+          <p:cNvPr id="511067" name="Line 91"/>
+          <p:cNvSpPr>
+            <a:spLocks noChangeShapeType="1"/>
+          </p:cNvSpPr>
+          <p:nvPr/>
+        </p:nvSpPr>
+        <p:spPr bwMode="auto">
+          <a:xfrm flipH="1">
+            <a:off x="1676400" y="3903663"/>
+            <a:ext cx="1295400" cy="381000"/>
+          </a:xfrm>
+          <a:prstGeom prst="line">
+            <a:avLst/>
+          </a:prstGeom>
+          <a:noFill/>
+          <a:ln w="9525">
+            <a:solidFill>
+              <a:schemeClr val="tx1"/>
+            </a:solidFill>
+            <a:miter lim="800000"/>
+            <a:headEnd/>
+            <a:tailEnd/>
+          </a:ln>
+          <a:effectLst/>
+        </p:spPr>
         <p:txBody>
           <a:bodyPr/>
           <a:lstStyle/>
@@ -6801,40 +8431,1093 @@
           </a:p>
         </p:txBody>
       </p:sp>
-      <p:sp>
-        <p:nvSpPr>
-          <p:cNvPr id="5" name="Espaço Reservado para Número de Slide 4"/>
-          <p:cNvSpPr>
-            <a:spLocks noGrp="1"/>
-          </p:cNvSpPr>
-          <p:nvPr>
-            <p:ph type="sldNum" sz="quarter" idx="12"/>
-          </p:nvPr>
-        </p:nvSpPr>
-        <p:spPr/>
+      <p:grpSp>
+        <p:nvGrpSpPr>
+          <p:cNvPr id="6" name="Group 92"/>
+          <p:cNvGrpSpPr>
+            <a:grpSpLocks/>
+          </p:cNvGrpSpPr>
+          <p:nvPr/>
+        </p:nvGrpSpPr>
+        <p:grpSpPr bwMode="auto">
+          <a:xfrm>
+            <a:off x="3124200" y="2989263"/>
+            <a:ext cx="152400" cy="914400"/>
+            <a:chOff x="1134" y="4194"/>
+            <a:chExt cx="1440" cy="5580"/>
+          </a:xfrm>
+        </p:grpSpPr>
+        <p:sp>
+          <p:nvSpPr>
+            <p:cNvPr id="511069" name="AutoShape 93"/>
+            <p:cNvSpPr>
+              <a:spLocks noChangeArrowheads="1"/>
+            </p:cNvSpPr>
+            <p:nvPr/>
+          </p:nvSpPr>
+          <p:spPr bwMode="auto">
+            <a:xfrm>
+              <a:off x="1134" y="4194"/>
+              <a:ext cx="1440" cy="1260"/>
+            </a:xfrm>
+            <a:prstGeom prst="triangle">
+              <a:avLst>
+                <a:gd name="adj" fmla="val 50000"/>
+              </a:avLst>
+            </a:prstGeom>
+            <a:solidFill>
+              <a:srgbClr val="FFFFFF"/>
+            </a:solidFill>
+            <a:ln w="12700">
+              <a:solidFill>
+                <a:schemeClr val="tx1"/>
+              </a:solidFill>
+              <a:miter lim="800000"/>
+              <a:headEnd/>
+              <a:tailEnd/>
+            </a:ln>
+          </p:spPr>
+          <p:txBody>
+            <a:bodyPr/>
+            <a:lstStyle/>
+            <a:p>
+              <a:endParaRPr lang="pt-BR"/>
+            </a:p>
+          </p:txBody>
+        </p:sp>
+        <p:sp>
+          <p:nvSpPr>
+            <p:cNvPr id="511070" name="Line 94"/>
+            <p:cNvSpPr>
+              <a:spLocks noChangeShapeType="1"/>
+            </p:cNvSpPr>
+            <p:nvPr/>
+          </p:nvSpPr>
+          <p:spPr bwMode="auto">
+            <a:xfrm>
+              <a:off x="1854" y="5454"/>
+              <a:ext cx="0" cy="4320"/>
+            </a:xfrm>
+            <a:prstGeom prst="line">
+              <a:avLst/>
+            </a:prstGeom>
+            <a:noFill/>
+            <a:ln w="12700">
+              <a:solidFill>
+                <a:schemeClr val="tx1"/>
+              </a:solidFill>
+              <a:round/>
+              <a:headEnd/>
+              <a:tailEnd/>
+            </a:ln>
+          </p:spPr>
+          <p:txBody>
+            <a:bodyPr/>
+            <a:lstStyle/>
+            <a:p>
+              <a:endParaRPr lang="pt-BR"/>
+            </a:p>
+          </p:txBody>
+        </p:sp>
+      </p:grpSp>
+      <p:sp>
+        <p:nvSpPr>
+          <p:cNvPr id="511071" name="Line 95"/>
+          <p:cNvSpPr>
+            <a:spLocks noChangeShapeType="1"/>
+          </p:cNvSpPr>
+          <p:nvPr/>
+        </p:nvSpPr>
+        <p:spPr bwMode="auto">
+          <a:xfrm>
+            <a:off x="3200400" y="3903663"/>
+            <a:ext cx="1295400" cy="381000"/>
+          </a:xfrm>
+          <a:prstGeom prst="line">
+            <a:avLst/>
+          </a:prstGeom>
+          <a:noFill/>
+          <a:ln w="9525">
+            <a:solidFill>
+              <a:schemeClr val="tx1"/>
+            </a:solidFill>
+            <a:miter lim="800000"/>
+            <a:headEnd/>
+            <a:tailEnd/>
+          </a:ln>
+          <a:effectLst/>
+        </p:spPr>
         <p:txBody>
           <a:bodyPr/>
           <a:lstStyle/>
           <a:p>
-            <a:pPr>
-              <a:defRPr/>
-            </a:pPr>
-            <a:fld id="{DAB16DC1-F000-4B90-9425-1E014EE80EC3}" type="slidenum">
-              <a:rPr lang="pt-BR" smtClean="0"/>
-              <a:pPr>
-                <a:defRPr/>
-              </a:pPr>
-              <a:t>6</a:t>
-            </a:fld>
             <a:endParaRPr lang="pt-BR"/>
           </a:p>
         </p:txBody>
       </p:sp>
+      <p:graphicFrame>
+        <p:nvGraphicFramePr>
+          <p:cNvPr id="511099" name="Group 123"/>
+          <p:cNvGraphicFramePr>
+            <a:graphicFrameLocks noGrp="1"/>
+          </p:cNvGraphicFramePr>
+          <p:nvPr/>
+        </p:nvGraphicFramePr>
+        <p:xfrm>
+          <a:off x="971550" y="5638800"/>
+          <a:ext cx="3352800" cy="335280"/>
+        </p:xfrm>
+        <a:graphic>
+          <a:graphicData uri="http://schemas.openxmlformats.org/drawingml/2006/table">
+            <a:tbl>
+              <a:tblPr/>
+              <a:tblGrid>
+                <a:gridCol w="3352800"/>
+              </a:tblGrid>
+              <a:tr h="190500">
+                <a:tc>
+                  <a:txBody>
+                    <a:bodyPr/>
+                    <a:lstStyle/>
+                    <a:p>
+                      <a:pPr marL="0" marR="0" lvl="0" indent="0" algn="ctr" defTabSz="914400" rtl="0" eaLnBrk="1" fontAlgn="base" latinLnBrk="0" hangingPunct="1">
+                        <a:lnSpc>
+                          <a:spcPct val="100000"/>
+                        </a:lnSpc>
+                        <a:spcBef>
+                          <a:spcPct val="60000"/>
+                        </a:spcBef>
+                        <a:spcAft>
+                          <a:spcPct val="0"/>
+                        </a:spcAft>
+                        <a:buClr>
+                          <a:schemeClr val="tx1"/>
+                        </a:buClr>
+                        <a:buSzTx/>
+                        <a:buFontTx/>
+                        <a:buNone/>
+                        <a:tabLst/>
+                      </a:pPr>
+                      <a:r>
+                        <a:rPr kumimoji="0" lang="pt-BR" sz="1600" b="0" i="0" u="none" strike="noStrike" cap="none" normalizeH="0" baseline="0" smtClean="0">
+                          <a:ln>
+                            <a:noFill/>
+                          </a:ln>
+                          <a:solidFill>
+                            <a:schemeClr val="tx1"/>
+                          </a:solidFill>
+                          <a:effectLst/>
+                          <a:latin typeface="Arial" charset="0"/>
+                        </a:rPr>
+                        <a:t>ArrayIndexOutOfBoundsException</a:t>
+                      </a:r>
+                    </a:p>
+                  </a:txBody>
+                  <a:tcPr horzOverflow="overflow">
+                    <a:lnL w="28575" cap="flat" cmpd="sng" algn="ctr">
+                      <a:solidFill>
+                        <a:schemeClr val="tx1"/>
+                      </a:solidFill>
+                      <a:prstDash val="solid"/>
+                      <a:round/>
+                      <a:headEnd type="none" w="med" len="med"/>
+                      <a:tailEnd type="none" w="med" len="med"/>
+                    </a:lnL>
+                    <a:lnR w="28575" cap="flat" cmpd="sng" algn="ctr">
+                      <a:solidFill>
+                        <a:schemeClr val="tx1"/>
+                      </a:solidFill>
+                      <a:prstDash val="solid"/>
+                      <a:round/>
+                      <a:headEnd type="none" w="med" len="med"/>
+                      <a:tailEnd type="none" w="med" len="med"/>
+                    </a:lnR>
+                    <a:lnT w="28575" cap="flat" cmpd="sng" algn="ctr">
+                      <a:solidFill>
+                        <a:schemeClr val="tx1"/>
+                      </a:solidFill>
+                      <a:prstDash val="solid"/>
+                      <a:round/>
+                      <a:headEnd type="none" w="med" len="med"/>
+                      <a:tailEnd type="none" w="med" len="med"/>
+                    </a:lnT>
+                    <a:lnB w="28575" cap="flat" cmpd="sng" algn="ctr">
+                      <a:solidFill>
+                        <a:schemeClr val="tx1"/>
+                      </a:solidFill>
+                      <a:prstDash val="solid"/>
+                      <a:round/>
+                      <a:headEnd type="none" w="med" len="med"/>
+                      <a:tailEnd type="none" w="med" len="med"/>
+                    </a:lnB>
+                    <a:lnTlToBr>
+                      <a:noFill/>
+                    </a:lnTlToBr>
+                    <a:lnBlToTr>
+                      <a:noFill/>
+                    </a:lnBlToTr>
+                    <a:noFill/>
+                  </a:tcPr>
+                </a:tc>
+              </a:tr>
+            </a:tbl>
+          </a:graphicData>
+        </a:graphic>
+      </p:graphicFrame>
+      <p:graphicFrame>
+        <p:nvGraphicFramePr>
+          <p:cNvPr id="511080" name="Group 104"/>
+          <p:cNvGraphicFramePr>
+            <a:graphicFrameLocks noGrp="1"/>
+          </p:cNvGraphicFramePr>
+          <p:nvPr/>
+        </p:nvGraphicFramePr>
+        <p:xfrm>
+          <a:off x="838200" y="5029200"/>
+          <a:ext cx="2035175" cy="335280"/>
+        </p:xfrm>
+        <a:graphic>
+          <a:graphicData uri="http://schemas.openxmlformats.org/drawingml/2006/table">
+            <a:tbl>
+              <a:tblPr/>
+              <a:tblGrid>
+                <a:gridCol w="2035175"/>
+              </a:tblGrid>
+              <a:tr h="190500">
+                <a:tc>
+                  <a:txBody>
+                    <a:bodyPr/>
+                    <a:lstStyle/>
+                    <a:p>
+                      <a:pPr marL="0" marR="0" lvl="0" indent="0" algn="ctr" defTabSz="914400" rtl="0" eaLnBrk="1" fontAlgn="base" latinLnBrk="0" hangingPunct="1">
+                        <a:lnSpc>
+                          <a:spcPct val="100000"/>
+                        </a:lnSpc>
+                        <a:spcBef>
+                          <a:spcPct val="60000"/>
+                        </a:spcBef>
+                        <a:spcAft>
+                          <a:spcPct val="0"/>
+                        </a:spcAft>
+                        <a:buClr>
+                          <a:schemeClr val="tx1"/>
+                        </a:buClr>
+                        <a:buSzTx/>
+                        <a:buFontTx/>
+                        <a:buNone/>
+                        <a:tabLst/>
+                      </a:pPr>
+                      <a:r>
+                        <a:rPr kumimoji="0" lang="pt-BR" sz="1600" b="0" i="0" u="none" strike="noStrike" cap="none" normalizeH="0" baseline="0" smtClean="0">
+                          <a:ln>
+                            <a:noFill/>
+                          </a:ln>
+                          <a:solidFill>
+                            <a:schemeClr val="tx1"/>
+                          </a:solidFill>
+                          <a:effectLst/>
+                          <a:latin typeface="Arial" charset="0"/>
+                        </a:rPr>
+                        <a:t>ArithmeticException</a:t>
+                      </a:r>
+                    </a:p>
+                  </a:txBody>
+                  <a:tcPr horzOverflow="overflow">
+                    <a:lnL w="28575" cap="flat" cmpd="sng" algn="ctr">
+                      <a:solidFill>
+                        <a:schemeClr val="tx1"/>
+                      </a:solidFill>
+                      <a:prstDash val="solid"/>
+                      <a:round/>
+                      <a:headEnd type="none" w="med" len="med"/>
+                      <a:tailEnd type="none" w="med" len="med"/>
+                    </a:lnL>
+                    <a:lnR w="28575" cap="flat" cmpd="sng" algn="ctr">
+                      <a:solidFill>
+                        <a:schemeClr val="tx1"/>
+                      </a:solidFill>
+                      <a:prstDash val="solid"/>
+                      <a:round/>
+                      <a:headEnd type="none" w="med" len="med"/>
+                      <a:tailEnd type="none" w="med" len="med"/>
+                    </a:lnR>
+                    <a:lnT w="28575" cap="flat" cmpd="sng" algn="ctr">
+                      <a:solidFill>
+                        <a:schemeClr val="tx1"/>
+                      </a:solidFill>
+                      <a:prstDash val="solid"/>
+                      <a:round/>
+                      <a:headEnd type="none" w="med" len="med"/>
+                      <a:tailEnd type="none" w="med" len="med"/>
+                    </a:lnT>
+                    <a:lnB w="28575" cap="flat" cmpd="sng" algn="ctr">
+                      <a:solidFill>
+                        <a:schemeClr val="tx1"/>
+                      </a:solidFill>
+                      <a:prstDash val="solid"/>
+                      <a:round/>
+                      <a:headEnd type="none" w="med" len="med"/>
+                      <a:tailEnd type="none" w="med" len="med"/>
+                    </a:lnB>
+                    <a:lnTlToBr>
+                      <a:noFill/>
+                    </a:lnTlToBr>
+                    <a:lnBlToTr>
+                      <a:noFill/>
+                    </a:lnBlToTr>
+                    <a:noFill/>
+                  </a:tcPr>
+                </a:tc>
+              </a:tr>
+            </a:tbl>
+          </a:graphicData>
+        </a:graphic>
+      </p:graphicFrame>
+      <p:graphicFrame>
+        <p:nvGraphicFramePr>
+          <p:cNvPr id="511096" name="Group 120"/>
+          <p:cNvGraphicFramePr>
+            <a:graphicFrameLocks noGrp="1"/>
+          </p:cNvGraphicFramePr>
+          <p:nvPr/>
+        </p:nvGraphicFramePr>
+        <p:xfrm>
+          <a:off x="4953000" y="5638800"/>
+          <a:ext cx="2514600" cy="335280"/>
+        </p:xfrm>
+        <a:graphic>
+          <a:graphicData uri="http://schemas.openxmlformats.org/drawingml/2006/table">
+            <a:tbl>
+              <a:tblPr/>
+              <a:tblGrid>
+                <a:gridCol w="2514600"/>
+              </a:tblGrid>
+              <a:tr h="190500">
+                <a:tc>
+                  <a:txBody>
+                    <a:bodyPr/>
+                    <a:lstStyle/>
+                    <a:p>
+                      <a:pPr marL="0" marR="0" lvl="0" indent="0" algn="ctr" defTabSz="914400" rtl="0" eaLnBrk="1" fontAlgn="base" latinLnBrk="0" hangingPunct="1">
+                        <a:lnSpc>
+                          <a:spcPct val="100000"/>
+                        </a:lnSpc>
+                        <a:spcBef>
+                          <a:spcPct val="60000"/>
+                        </a:spcBef>
+                        <a:spcAft>
+                          <a:spcPct val="0"/>
+                        </a:spcAft>
+                        <a:buClr>
+                          <a:schemeClr val="tx1"/>
+                        </a:buClr>
+                        <a:buSzTx/>
+                        <a:buFontTx/>
+                        <a:buNone/>
+                        <a:tabLst/>
+                      </a:pPr>
+                      <a:r>
+                        <a:rPr kumimoji="0" lang="pt-BR" sz="1600" b="0" i="0" u="none" strike="noStrike" cap="none" normalizeH="0" baseline="0" smtClean="0">
+                          <a:ln>
+                            <a:noFill/>
+                          </a:ln>
+                          <a:solidFill>
+                            <a:schemeClr val="tx1"/>
+                          </a:solidFill>
+                          <a:effectLst/>
+                          <a:latin typeface="Arial" charset="0"/>
+                        </a:rPr>
+                        <a:t>NumberFormatException</a:t>
+                      </a:r>
+                    </a:p>
+                  </a:txBody>
+                  <a:tcPr horzOverflow="overflow">
+                    <a:lnL w="28575" cap="flat" cmpd="sng" algn="ctr">
+                      <a:solidFill>
+                        <a:schemeClr val="tx1"/>
+                      </a:solidFill>
+                      <a:prstDash val="solid"/>
+                      <a:round/>
+                      <a:headEnd type="none" w="med" len="med"/>
+                      <a:tailEnd type="none" w="med" len="med"/>
+                    </a:lnL>
+                    <a:lnR w="28575" cap="flat" cmpd="sng" algn="ctr">
+                      <a:solidFill>
+                        <a:schemeClr val="tx1"/>
+                      </a:solidFill>
+                      <a:prstDash val="solid"/>
+                      <a:round/>
+                      <a:headEnd type="none" w="med" len="med"/>
+                      <a:tailEnd type="none" w="med" len="med"/>
+                    </a:lnR>
+                    <a:lnT w="28575" cap="flat" cmpd="sng" algn="ctr">
+                      <a:solidFill>
+                        <a:schemeClr val="tx1"/>
+                      </a:solidFill>
+                      <a:prstDash val="solid"/>
+                      <a:round/>
+                      <a:headEnd type="none" w="med" len="med"/>
+                      <a:tailEnd type="none" w="med" len="med"/>
+                    </a:lnT>
+                    <a:lnB w="28575" cap="flat" cmpd="sng" algn="ctr">
+                      <a:solidFill>
+                        <a:schemeClr val="tx1"/>
+                      </a:solidFill>
+                      <a:prstDash val="solid"/>
+                      <a:round/>
+                      <a:headEnd type="none" w="med" len="med"/>
+                      <a:tailEnd type="none" w="med" len="med"/>
+                    </a:lnB>
+                    <a:lnTlToBr>
+                      <a:noFill/>
+                    </a:lnTlToBr>
+                    <a:lnBlToTr>
+                      <a:noFill/>
+                    </a:lnBlToTr>
+                    <a:noFill/>
+                  </a:tcPr>
+                </a:tc>
+              </a:tr>
+            </a:tbl>
+          </a:graphicData>
+        </a:graphic>
+      </p:graphicFrame>
+      <p:grpSp>
+        <p:nvGrpSpPr>
+          <p:cNvPr id="7" name="Group 124"/>
+          <p:cNvGrpSpPr>
+            <a:grpSpLocks/>
+          </p:cNvGrpSpPr>
+          <p:nvPr/>
+        </p:nvGrpSpPr>
+        <p:grpSpPr bwMode="auto">
+          <a:xfrm rot="17826650" flipH="1">
+            <a:off x="5307012" y="2032001"/>
+            <a:ext cx="138113" cy="830262"/>
+            <a:chOff x="1134" y="4194"/>
+            <a:chExt cx="1440" cy="5580"/>
+          </a:xfrm>
+        </p:grpSpPr>
+        <p:sp>
+          <p:nvSpPr>
+            <p:cNvPr id="511101" name="AutoShape 125"/>
+            <p:cNvSpPr>
+              <a:spLocks noChangeArrowheads="1"/>
+            </p:cNvSpPr>
+            <p:nvPr/>
+          </p:nvSpPr>
+          <p:spPr bwMode="auto">
+            <a:xfrm>
+              <a:off x="1134" y="4194"/>
+              <a:ext cx="1440" cy="1260"/>
+            </a:xfrm>
+            <a:prstGeom prst="triangle">
+              <a:avLst>
+                <a:gd name="adj" fmla="val 50000"/>
+              </a:avLst>
+            </a:prstGeom>
+            <a:solidFill>
+              <a:srgbClr val="FFFFFF"/>
+            </a:solidFill>
+            <a:ln w="12700">
+              <a:solidFill>
+                <a:schemeClr val="tx1"/>
+              </a:solidFill>
+              <a:miter lim="800000"/>
+              <a:headEnd/>
+              <a:tailEnd/>
+            </a:ln>
+          </p:spPr>
+          <p:txBody>
+            <a:bodyPr/>
+            <a:lstStyle/>
+            <a:p>
+              <a:endParaRPr lang="pt-BR"/>
+            </a:p>
+          </p:txBody>
+        </p:sp>
+        <p:sp>
+          <p:nvSpPr>
+            <p:cNvPr id="511102" name="Line 126"/>
+            <p:cNvSpPr>
+              <a:spLocks noChangeShapeType="1"/>
+            </p:cNvSpPr>
+            <p:nvPr/>
+          </p:nvSpPr>
+          <p:spPr bwMode="auto">
+            <a:xfrm>
+              <a:off x="1854" y="5454"/>
+              <a:ext cx="0" cy="4320"/>
+            </a:xfrm>
+            <a:prstGeom prst="line">
+              <a:avLst/>
+            </a:prstGeom>
+            <a:noFill/>
+            <a:ln w="12700">
+              <a:solidFill>
+                <a:schemeClr val="tx1"/>
+              </a:solidFill>
+              <a:round/>
+              <a:headEnd/>
+              <a:tailEnd/>
+            </a:ln>
+          </p:spPr>
+          <p:txBody>
+            <a:bodyPr/>
+            <a:lstStyle/>
+            <a:p>
+              <a:endParaRPr lang="pt-BR"/>
+            </a:p>
+          </p:txBody>
+        </p:sp>
+      </p:grpSp>
+      <p:graphicFrame>
+        <p:nvGraphicFramePr>
+          <p:cNvPr id="511110" name="Group 134"/>
+          <p:cNvGraphicFramePr>
+            <a:graphicFrameLocks noGrp="1"/>
+          </p:cNvGraphicFramePr>
+          <p:nvPr/>
+        </p:nvGraphicFramePr>
+        <p:xfrm>
+          <a:off x="6553200" y="5029200"/>
+          <a:ext cx="2122488" cy="335280"/>
+        </p:xfrm>
+        <a:graphic>
+          <a:graphicData uri="http://schemas.openxmlformats.org/drawingml/2006/table">
+            <a:tbl>
+              <a:tblPr/>
+              <a:tblGrid>
+                <a:gridCol w="2122488"/>
+              </a:tblGrid>
+              <a:tr h="304800">
+                <a:tc>
+                  <a:txBody>
+                    <a:bodyPr/>
+                    <a:lstStyle/>
+                    <a:p>
+                      <a:pPr marL="0" marR="0" lvl="0" indent="0" algn="ctr" defTabSz="914400" rtl="0" eaLnBrk="1" fontAlgn="base" latinLnBrk="0" hangingPunct="1">
+                        <a:lnSpc>
+                          <a:spcPct val="100000"/>
+                        </a:lnSpc>
+                        <a:spcBef>
+                          <a:spcPct val="60000"/>
+                        </a:spcBef>
+                        <a:spcAft>
+                          <a:spcPct val="0"/>
+                        </a:spcAft>
+                        <a:buClr>
+                          <a:schemeClr val="tx1"/>
+                        </a:buClr>
+                        <a:buSzTx/>
+                        <a:buFontTx/>
+                        <a:buNone/>
+                        <a:tabLst/>
+                      </a:pPr>
+                      <a:r>
+                        <a:rPr kumimoji="0" lang="pt-BR" sz="1600" b="0" i="0" u="none" strike="noStrike" cap="none" normalizeH="0" baseline="0" smtClean="0">
+                          <a:ln>
+                            <a:noFill/>
+                          </a:ln>
+                          <a:solidFill>
+                            <a:schemeClr val="tx1"/>
+                          </a:solidFill>
+                          <a:effectLst/>
+                          <a:latin typeface="Arial" charset="0"/>
+                        </a:rPr>
+                        <a:t>NullPointerException</a:t>
+                      </a:r>
+                    </a:p>
+                  </a:txBody>
+                  <a:tcPr horzOverflow="overflow">
+                    <a:lnL w="28575" cap="flat" cmpd="sng" algn="ctr">
+                      <a:solidFill>
+                        <a:schemeClr val="tx1"/>
+                      </a:solidFill>
+                      <a:prstDash val="solid"/>
+                      <a:round/>
+                      <a:headEnd type="none" w="med" len="med"/>
+                      <a:tailEnd type="none" w="med" len="med"/>
+                    </a:lnL>
+                    <a:lnR w="28575" cap="flat" cmpd="sng" algn="ctr">
+                      <a:solidFill>
+                        <a:schemeClr val="tx1"/>
+                      </a:solidFill>
+                      <a:prstDash val="solid"/>
+                      <a:round/>
+                      <a:headEnd type="none" w="med" len="med"/>
+                      <a:tailEnd type="none" w="med" len="med"/>
+                    </a:lnR>
+                    <a:lnT w="28575" cap="flat" cmpd="sng" algn="ctr">
+                      <a:solidFill>
+                        <a:schemeClr val="tx1"/>
+                      </a:solidFill>
+                      <a:prstDash val="solid"/>
+                      <a:round/>
+                      <a:headEnd type="none" w="med" len="med"/>
+                      <a:tailEnd type="none" w="med" len="med"/>
+                    </a:lnT>
+                    <a:lnB w="28575" cap="flat" cmpd="sng" algn="ctr">
+                      <a:solidFill>
+                        <a:schemeClr val="tx1"/>
+                      </a:solidFill>
+                      <a:prstDash val="solid"/>
+                      <a:round/>
+                      <a:headEnd type="none" w="med" len="med"/>
+                      <a:tailEnd type="none" w="med" len="med"/>
+                    </a:lnB>
+                    <a:lnTlToBr>
+                      <a:noFill/>
+                    </a:lnTlToBr>
+                    <a:lnBlToTr>
+                      <a:noFill/>
+                    </a:lnBlToTr>
+                    <a:noFill/>
+                  </a:tcPr>
+                </a:tc>
+              </a:tr>
+            </a:tbl>
+          </a:graphicData>
+        </a:graphic>
+      </p:graphicFrame>
+      <p:grpSp>
+        <p:nvGrpSpPr>
+          <p:cNvPr id="8" name="Group 135"/>
+          <p:cNvGrpSpPr>
+            <a:grpSpLocks/>
+          </p:cNvGrpSpPr>
+          <p:nvPr/>
+        </p:nvGrpSpPr>
+        <p:grpSpPr bwMode="auto">
+          <a:xfrm rot="2987640">
+            <a:off x="3558381" y="4518819"/>
+            <a:ext cx="157163" cy="720725"/>
+            <a:chOff x="1134" y="4194"/>
+            <a:chExt cx="1440" cy="5580"/>
+          </a:xfrm>
+        </p:grpSpPr>
+        <p:sp>
+          <p:nvSpPr>
+            <p:cNvPr id="511112" name="AutoShape 136"/>
+            <p:cNvSpPr>
+              <a:spLocks noChangeArrowheads="1"/>
+            </p:cNvSpPr>
+            <p:nvPr/>
+          </p:nvSpPr>
+          <p:spPr bwMode="auto">
+            <a:xfrm>
+              <a:off x="1134" y="4194"/>
+              <a:ext cx="1440" cy="1260"/>
+            </a:xfrm>
+            <a:prstGeom prst="triangle">
+              <a:avLst>
+                <a:gd name="adj" fmla="val 50000"/>
+              </a:avLst>
+            </a:prstGeom>
+            <a:solidFill>
+              <a:srgbClr val="FFFFFF"/>
+            </a:solidFill>
+            <a:ln w="12700">
+              <a:solidFill>
+                <a:schemeClr val="tx1"/>
+              </a:solidFill>
+              <a:miter lim="800000"/>
+              <a:headEnd/>
+              <a:tailEnd/>
+            </a:ln>
+          </p:spPr>
+          <p:txBody>
+            <a:bodyPr/>
+            <a:lstStyle/>
+            <a:p>
+              <a:endParaRPr lang="pt-BR"/>
+            </a:p>
+          </p:txBody>
+        </p:sp>
+        <p:sp>
+          <p:nvSpPr>
+            <p:cNvPr id="511113" name="Line 137"/>
+            <p:cNvSpPr>
+              <a:spLocks noChangeShapeType="1"/>
+            </p:cNvSpPr>
+            <p:nvPr/>
+          </p:nvSpPr>
+          <p:spPr bwMode="auto">
+            <a:xfrm>
+              <a:off x="1854" y="5454"/>
+              <a:ext cx="0" cy="4320"/>
+            </a:xfrm>
+            <a:prstGeom prst="line">
+              <a:avLst/>
+            </a:prstGeom>
+            <a:noFill/>
+            <a:ln w="12700">
+              <a:solidFill>
+                <a:schemeClr val="tx1"/>
+              </a:solidFill>
+              <a:round/>
+              <a:headEnd/>
+              <a:tailEnd/>
+            </a:ln>
+          </p:spPr>
+          <p:txBody>
+            <a:bodyPr/>
+            <a:lstStyle/>
+            <a:p>
+              <a:endParaRPr lang="pt-BR"/>
+            </a:p>
+          </p:txBody>
+        </p:sp>
+      </p:grpSp>
+      <p:grpSp>
+        <p:nvGrpSpPr>
+          <p:cNvPr id="9" name="Group 138"/>
+          <p:cNvGrpSpPr>
+            <a:grpSpLocks/>
+          </p:cNvGrpSpPr>
+          <p:nvPr/>
+        </p:nvGrpSpPr>
+        <p:grpSpPr bwMode="auto">
+          <a:xfrm rot="18612360" flipH="1">
+            <a:off x="5463381" y="4518819"/>
+            <a:ext cx="157163" cy="720725"/>
+            <a:chOff x="1134" y="4194"/>
+            <a:chExt cx="1440" cy="5580"/>
+          </a:xfrm>
+        </p:grpSpPr>
+        <p:sp>
+          <p:nvSpPr>
+            <p:cNvPr id="511115" name="AutoShape 139"/>
+            <p:cNvSpPr>
+              <a:spLocks noChangeArrowheads="1"/>
+            </p:cNvSpPr>
+            <p:nvPr/>
+          </p:nvSpPr>
+          <p:spPr bwMode="auto">
+            <a:xfrm>
+              <a:off x="1134" y="4194"/>
+              <a:ext cx="1440" cy="1260"/>
+            </a:xfrm>
+            <a:prstGeom prst="triangle">
+              <a:avLst>
+                <a:gd name="adj" fmla="val 50000"/>
+              </a:avLst>
+            </a:prstGeom>
+            <a:solidFill>
+              <a:srgbClr val="FFFFFF"/>
+            </a:solidFill>
+            <a:ln w="12700">
+              <a:solidFill>
+                <a:schemeClr val="tx1"/>
+              </a:solidFill>
+              <a:miter lim="800000"/>
+              <a:headEnd/>
+              <a:tailEnd/>
+            </a:ln>
+          </p:spPr>
+          <p:txBody>
+            <a:bodyPr/>
+            <a:lstStyle/>
+            <a:p>
+              <a:endParaRPr lang="pt-BR"/>
+            </a:p>
+          </p:txBody>
+        </p:sp>
+        <p:sp>
+          <p:nvSpPr>
+            <p:cNvPr id="511116" name="Line 140"/>
+            <p:cNvSpPr>
+              <a:spLocks noChangeShapeType="1"/>
+            </p:cNvSpPr>
+            <p:nvPr/>
+          </p:nvSpPr>
+          <p:spPr bwMode="auto">
+            <a:xfrm>
+              <a:off x="1854" y="5454"/>
+              <a:ext cx="0" cy="4320"/>
+            </a:xfrm>
+            <a:prstGeom prst="line">
+              <a:avLst/>
+            </a:prstGeom>
+            <a:noFill/>
+            <a:ln w="12700">
+              <a:solidFill>
+                <a:schemeClr val="tx1"/>
+              </a:solidFill>
+              <a:round/>
+              <a:headEnd/>
+              <a:tailEnd/>
+            </a:ln>
+          </p:spPr>
+          <p:txBody>
+            <a:bodyPr/>
+            <a:lstStyle/>
+            <a:p>
+              <a:endParaRPr lang="pt-BR"/>
+            </a:p>
+          </p:txBody>
+        </p:sp>
+      </p:grpSp>
+      <p:sp>
+        <p:nvSpPr>
+          <p:cNvPr id="511117" name="Line 141"/>
+          <p:cNvSpPr>
+            <a:spLocks noChangeShapeType="1"/>
+          </p:cNvSpPr>
+          <p:nvPr/>
+        </p:nvSpPr>
+        <p:spPr bwMode="auto">
+          <a:xfrm>
+            <a:off x="5791200" y="5105400"/>
+            <a:ext cx="762000" cy="0"/>
+          </a:xfrm>
+          <a:prstGeom prst="line">
+            <a:avLst/>
+          </a:prstGeom>
+          <a:noFill/>
+          <a:ln w="9525">
+            <a:solidFill>
+              <a:schemeClr val="tx1"/>
+            </a:solidFill>
+            <a:miter lim="800000"/>
+            <a:headEnd/>
+            <a:tailEnd/>
+          </a:ln>
+          <a:effectLst/>
+        </p:spPr>
+        <p:txBody>
+          <a:bodyPr/>
+          <a:lstStyle/>
+          <a:p>
+            <a:endParaRPr lang="pt-BR"/>
+          </a:p>
+        </p:txBody>
+      </p:sp>
+      <p:sp>
+        <p:nvSpPr>
+          <p:cNvPr id="511118" name="Line 142"/>
+          <p:cNvSpPr>
+            <a:spLocks noChangeShapeType="1"/>
+          </p:cNvSpPr>
+          <p:nvPr/>
+        </p:nvSpPr>
+        <p:spPr bwMode="auto">
+          <a:xfrm>
+            <a:off x="2895600" y="5105400"/>
+            <a:ext cx="457200" cy="0"/>
+          </a:xfrm>
+          <a:prstGeom prst="line">
+            <a:avLst/>
+          </a:prstGeom>
+          <a:noFill/>
+          <a:ln w="9525">
+            <a:solidFill>
+              <a:schemeClr val="tx1"/>
+            </a:solidFill>
+            <a:miter lim="800000"/>
+            <a:headEnd/>
+            <a:tailEnd/>
+          </a:ln>
+          <a:effectLst/>
+        </p:spPr>
+        <p:txBody>
+          <a:bodyPr/>
+          <a:lstStyle/>
+          <a:p>
+            <a:endParaRPr lang="pt-BR"/>
+          </a:p>
+        </p:txBody>
+      </p:sp>
+      <p:grpSp>
+        <p:nvGrpSpPr>
+          <p:cNvPr id="10" name="Group 143"/>
+          <p:cNvGrpSpPr>
+            <a:grpSpLocks/>
+          </p:cNvGrpSpPr>
+          <p:nvPr/>
+        </p:nvGrpSpPr>
+        <p:grpSpPr bwMode="auto">
+          <a:xfrm>
+            <a:off x="4067175" y="4648200"/>
+            <a:ext cx="152400" cy="990600"/>
+            <a:chOff x="1134" y="4194"/>
+            <a:chExt cx="1440" cy="5580"/>
+          </a:xfrm>
+        </p:grpSpPr>
+        <p:sp>
+          <p:nvSpPr>
+            <p:cNvPr id="511120" name="AutoShape 144"/>
+            <p:cNvSpPr>
+              <a:spLocks noChangeArrowheads="1"/>
+            </p:cNvSpPr>
+            <p:nvPr/>
+          </p:nvSpPr>
+          <p:spPr bwMode="auto">
+            <a:xfrm>
+              <a:off x="1134" y="4194"/>
+              <a:ext cx="1440" cy="1260"/>
+            </a:xfrm>
+            <a:prstGeom prst="triangle">
+              <a:avLst>
+                <a:gd name="adj" fmla="val 50000"/>
+              </a:avLst>
+            </a:prstGeom>
+            <a:solidFill>
+              <a:srgbClr val="FFFFFF"/>
+            </a:solidFill>
+            <a:ln w="12700">
+              <a:solidFill>
+                <a:schemeClr val="tx1"/>
+              </a:solidFill>
+              <a:miter lim="800000"/>
+              <a:headEnd/>
+              <a:tailEnd/>
+            </a:ln>
+          </p:spPr>
+          <p:txBody>
+            <a:bodyPr/>
+            <a:lstStyle/>
+            <a:p>
+              <a:endParaRPr lang="pt-BR"/>
+            </a:p>
+          </p:txBody>
+        </p:sp>
+        <p:sp>
+          <p:nvSpPr>
+            <p:cNvPr id="511121" name="Line 145"/>
+            <p:cNvSpPr>
+              <a:spLocks noChangeShapeType="1"/>
+            </p:cNvSpPr>
+            <p:nvPr/>
+          </p:nvSpPr>
+          <p:spPr bwMode="auto">
+            <a:xfrm>
+              <a:off x="1854" y="5454"/>
+              <a:ext cx="0" cy="4320"/>
+            </a:xfrm>
+            <a:prstGeom prst="line">
+              <a:avLst/>
+            </a:prstGeom>
+            <a:noFill/>
+            <a:ln w="12700">
+              <a:solidFill>
+                <a:schemeClr val="tx1"/>
+              </a:solidFill>
+              <a:round/>
+              <a:headEnd/>
+              <a:tailEnd/>
+            </a:ln>
+          </p:spPr>
+          <p:txBody>
+            <a:bodyPr/>
+            <a:lstStyle/>
+            <a:p>
+              <a:endParaRPr lang="pt-BR"/>
+            </a:p>
+          </p:txBody>
+        </p:sp>
+      </p:grpSp>
+      <p:grpSp>
+        <p:nvGrpSpPr>
+          <p:cNvPr id="11" name="Group 146"/>
+          <p:cNvGrpSpPr>
+            <a:grpSpLocks/>
+          </p:cNvGrpSpPr>
+          <p:nvPr/>
+        </p:nvGrpSpPr>
+        <p:grpSpPr bwMode="auto">
+          <a:xfrm>
+            <a:off x="5029200" y="4648200"/>
+            <a:ext cx="152400" cy="990600"/>
+            <a:chOff x="1134" y="4194"/>
+            <a:chExt cx="1440" cy="5580"/>
+          </a:xfrm>
+        </p:grpSpPr>
+        <p:sp>
+          <p:nvSpPr>
+            <p:cNvPr id="511123" name="AutoShape 147"/>
+            <p:cNvSpPr>
+              <a:spLocks noChangeArrowheads="1"/>
+            </p:cNvSpPr>
+            <p:nvPr/>
+          </p:nvSpPr>
+          <p:spPr bwMode="auto">
+            <a:xfrm>
+              <a:off x="1134" y="4194"/>
+              <a:ext cx="1440" cy="1260"/>
+            </a:xfrm>
+            <a:prstGeom prst="triangle">
+              <a:avLst>
+                <a:gd name="adj" fmla="val 50000"/>
+              </a:avLst>
+            </a:prstGeom>
+            <a:solidFill>
+              <a:srgbClr val="FFFFFF"/>
+            </a:solidFill>
+            <a:ln w="12700">
+              <a:solidFill>
+                <a:schemeClr val="tx1"/>
+              </a:solidFill>
+              <a:miter lim="800000"/>
+              <a:headEnd/>
+              <a:tailEnd/>
+            </a:ln>
+          </p:spPr>
+          <p:txBody>
+            <a:bodyPr/>
+            <a:lstStyle/>
+            <a:p>
+              <a:endParaRPr lang="pt-BR"/>
+            </a:p>
+          </p:txBody>
+        </p:sp>
+        <p:sp>
+          <p:nvSpPr>
+            <p:cNvPr id="511124" name="Line 148"/>
+            <p:cNvSpPr>
+              <a:spLocks noChangeShapeType="1"/>
+            </p:cNvSpPr>
+            <p:nvPr/>
+          </p:nvSpPr>
+          <p:spPr bwMode="auto">
+            <a:xfrm>
+              <a:off x="1854" y="5454"/>
+              <a:ext cx="0" cy="4320"/>
+            </a:xfrm>
+            <a:prstGeom prst="line">
+              <a:avLst/>
+            </a:prstGeom>
+            <a:noFill/>
+            <a:ln w="12700">
+              <a:solidFill>
+                <a:schemeClr val="tx1"/>
+              </a:solidFill>
+              <a:round/>
+              <a:headEnd/>
+              <a:tailEnd/>
+            </a:ln>
+          </p:spPr>
+          <p:txBody>
+            <a:bodyPr/>
+            <a:lstStyle/>
+            <a:p>
+              <a:endParaRPr lang="pt-BR"/>
+            </a:p>
+          </p:txBody>
+        </p:sp>
+      </p:grpSp>
     </p:spTree>
   </p:cSld>
   <p:clrMapOvr>
     <a:masterClrMapping/>
   </p:clrMapOvr>
+  <p:timing>
+    <p:tnLst>
+      <p:par>
+        <p:cTn id="1" dur="indefinite" restart="never" nodeType="tmRoot"/>
+      </p:par>
+    </p:tnLst>
+  </p:timing>
 </p:sld>
 </file>
 
@@ -6865,12 +9548,7 @@
             <p:ph type="title"/>
           </p:nvPr>
         </p:nvSpPr>
-        <p:spPr>
-          <a:xfrm>
-            <a:off x="457200" y="274638"/>
-            <a:ext cx="8003232" cy="1143000"/>
-          </a:xfrm>
-        </p:spPr>
+        <p:spPr/>
         <p:txBody>
           <a:bodyPr/>
           <a:lstStyle/>
@@ -6885,7 +9563,7 @@
                 <a:ea typeface="+mj-ea"/>
                 <a:cs typeface="+mj-cs"/>
               </a:rPr>
-              <a:t>Principais métodos de exceções</a:t>
+              <a:t>Principais exceções</a:t>
             </a:r>
             <a:endParaRPr lang="pt-BR" dirty="0"/>
           </a:p>
@@ -6944,6 +9622,13 @@
   <p:clrMapOvr>
     <a:masterClrMapping/>
   </p:clrMapOvr>
+  <p:timing>
+    <p:tnLst>
+      <p:par>
+        <p:cTn id="1" dur="indefinite" restart="never" nodeType="tmRoot"/>
+      </p:par>
+    </p:tnLst>
+  </p:timing>
 </p:sld>
 </file>
 
@@ -6974,7 +9659,12 @@
             <p:ph type="title"/>
           </p:nvPr>
         </p:nvSpPr>
-        <p:spPr/>
+        <p:spPr>
+          <a:xfrm>
+            <a:off x="457200" y="274638"/>
+            <a:ext cx="8003232" cy="1143000"/>
+          </a:xfrm>
+        </p:spPr>
         <p:txBody>
           <a:bodyPr/>
           <a:lstStyle/>
@@ -6989,7 +9679,7 @@
                 <a:ea typeface="+mj-ea"/>
                 <a:cs typeface="+mj-cs"/>
               </a:rPr>
-              <a:t>Exceções transferidas</a:t>
+              <a:t>Principais métodos de exceções</a:t>
             </a:r>
             <a:endParaRPr lang="pt-BR" dirty="0"/>
           </a:p>
@@ -7048,6 +9738,13 @@
   <p:clrMapOvr>
     <a:masterClrMapping/>
   </p:clrMapOvr>
+  <p:timing>
+    <p:tnLst>
+      <p:par>
+        <p:cTn id="1" dur="indefinite" restart="never" nodeType="tmRoot"/>
+      </p:par>
+    </p:tnLst>
+  </p:timing>
 </p:sld>
 </file>
 
@@ -7093,18 +9790,7 @@
                 <a:ea typeface="+mj-ea"/>
                 <a:cs typeface="+mj-cs"/>
               </a:rPr>
-              <a:t>Cláusula </a:t>
-            </a:r>
-            <a:r>
-              <a:rPr lang="pt-BR" sz="4600" kern="1200" dirty="0" err="1" smtClean="0">
-                <a:solidFill>
-                  <a:schemeClr val="tx1"/>
-                </a:solidFill>
-                <a:latin typeface="+mj-lt"/>
-                <a:ea typeface="+mj-ea"/>
-                <a:cs typeface="+mj-cs"/>
-              </a:rPr>
-              <a:t>throws</a:t>
+              <a:t>Exceções transferidas</a:t>
             </a:r>
             <a:endParaRPr lang="pt-BR" dirty="0"/>
           </a:p>

</xml_diff>